<commit_message>
Finished the faculty presentation
</commit_message>
<xml_diff>
--- a/Faculty_Presentation_DRAFT_2.pptx
+++ b/Faculty_Presentation_DRAFT_2.pptx
@@ -6,14 +6,15 @@
   </p:sldMasterIdLst>
   <p:sldIdLst>
     <p:sldId id="256" r:id="rId2"/>
-    <p:sldId id="257" r:id="rId3"/>
+    <p:sldId id="267" r:id="rId3"/>
     <p:sldId id="266" r:id="rId4"/>
-    <p:sldId id="258" r:id="rId5"/>
-    <p:sldId id="259" r:id="rId6"/>
-    <p:sldId id="263" r:id="rId7"/>
-    <p:sldId id="265" r:id="rId8"/>
-    <p:sldId id="264" r:id="rId9"/>
-    <p:sldId id="260" r:id="rId10"/>
+    <p:sldId id="257" r:id="rId5"/>
+    <p:sldId id="258" r:id="rId6"/>
+    <p:sldId id="259" r:id="rId7"/>
+    <p:sldId id="263" r:id="rId8"/>
+    <p:sldId id="265" r:id="rId9"/>
+    <p:sldId id="264" r:id="rId10"/>
+    <p:sldId id="260" r:id="rId11"/>
   </p:sldIdLst>
   <p:sldSz cx="12192000" cy="6858000"/>
   <p:notesSz cx="6858000" cy="9144000"/>
@@ -120,6 +121,32 @@
 </p:presentation>
 </file>
 
+<file path=ppt/commentAuthors.xml><?xml version="1.0" encoding="utf-8"?>
+<p:cmAuthorLst xmlns:a="http://schemas.openxmlformats.org/drawingml/2006/main" xmlns:r="http://schemas.openxmlformats.org/officeDocument/2006/relationships" xmlns:p="http://schemas.openxmlformats.org/presentationml/2006/main">
+  <p:cmAuthor id="1" name="Nole Stites" initials="NS" lastIdx="1" clrIdx="0">
+    <p:extLst>
+      <p:ext uri="{19B8F6BF-5375-455C-9EA6-DF929625EA0E}">
+        <p15:presenceInfo xmlns:p15="http://schemas.microsoft.com/office/powerpoint/2012/main" userId="Nole Stites" providerId="None"/>
+      </p:ext>
+    </p:extLst>
+  </p:cmAuthor>
+</p:cmAuthorLst>
+</file>
+
+<file path=ppt/comments/comment1.xml><?xml version="1.0" encoding="utf-8"?>
+<p:cmLst xmlns:a="http://schemas.openxmlformats.org/drawingml/2006/main" xmlns:r="http://schemas.openxmlformats.org/officeDocument/2006/relationships" xmlns:p="http://schemas.openxmlformats.org/presentationml/2006/main">
+  <p:cm authorId="1" dt="2023-08-28T08:43:16.658" idx="1">
+    <p:pos x="6229" y="1982"/>
+    <p:text>Is our meaning of the term "graph" something that will be understood by everyone?</p:text>
+    <p:extLst>
+      <p:ext uri="{C676402C-5697-4E1C-873F-D02D1690AC5C}">
+        <p15:threadingInfo xmlns:p15="http://schemas.microsoft.com/office/powerpoint/2012/main" timeZoneBias="300"/>
+      </p:ext>
+    </p:extLst>
+  </p:cm>
+</p:cmLst>
+</file>
+
 <file path=ppt/slideLayouts/slideLayout1.xml><?xml version="1.0" encoding="utf-8"?>
 <p:sldLayout xmlns:a="http://schemas.openxmlformats.org/drawingml/2006/main" xmlns:r="http://schemas.openxmlformats.org/officeDocument/2006/relationships" xmlns:p="http://schemas.openxmlformats.org/presentationml/2006/main" type="title" preserve="1">
   <p:cSld name="Title Slide">
@@ -267,7 +294,7 @@
           <a:p>
             <a:fld id="{ACA28E0F-F992-422F-B1E4-A67EB2895762}" type="datetimeFigureOut">
               <a:rPr lang="en-US" smtClean="0"/>
-              <a:t>8/20/2023</a:t>
+              <a:t>8/31/2023</a:t>
             </a:fld>
             <a:endParaRPr lang="en-US"/>
           </a:p>
@@ -465,7 +492,7 @@
           <a:p>
             <a:fld id="{ACA28E0F-F992-422F-B1E4-A67EB2895762}" type="datetimeFigureOut">
               <a:rPr lang="en-US" smtClean="0"/>
-              <a:t>8/20/2023</a:t>
+              <a:t>8/31/2023</a:t>
             </a:fld>
             <a:endParaRPr lang="en-US"/>
           </a:p>
@@ -673,7 +700,7 @@
           <a:p>
             <a:fld id="{ACA28E0F-F992-422F-B1E4-A67EB2895762}" type="datetimeFigureOut">
               <a:rPr lang="en-US" smtClean="0"/>
-              <a:t>8/20/2023</a:t>
+              <a:t>8/31/2023</a:t>
             </a:fld>
             <a:endParaRPr lang="en-US"/>
           </a:p>
@@ -871,7 +898,7 @@
           <a:p>
             <a:fld id="{ACA28E0F-F992-422F-B1E4-A67EB2895762}" type="datetimeFigureOut">
               <a:rPr lang="en-US" smtClean="0"/>
-              <a:t>8/20/2023</a:t>
+              <a:t>8/31/2023</a:t>
             </a:fld>
             <a:endParaRPr lang="en-US"/>
           </a:p>
@@ -1146,7 +1173,7 @@
           <a:p>
             <a:fld id="{ACA28E0F-F992-422F-B1E4-A67EB2895762}" type="datetimeFigureOut">
               <a:rPr lang="en-US" smtClean="0"/>
-              <a:t>8/20/2023</a:t>
+              <a:t>8/31/2023</a:t>
             </a:fld>
             <a:endParaRPr lang="en-US"/>
           </a:p>
@@ -1411,7 +1438,7 @@
           <a:p>
             <a:fld id="{ACA28E0F-F992-422F-B1E4-A67EB2895762}" type="datetimeFigureOut">
               <a:rPr lang="en-US" smtClean="0"/>
-              <a:t>8/20/2023</a:t>
+              <a:t>8/31/2023</a:t>
             </a:fld>
             <a:endParaRPr lang="en-US"/>
           </a:p>
@@ -1823,7 +1850,7 @@
           <a:p>
             <a:fld id="{ACA28E0F-F992-422F-B1E4-A67EB2895762}" type="datetimeFigureOut">
               <a:rPr lang="en-US" smtClean="0"/>
-              <a:t>8/20/2023</a:t>
+              <a:t>8/31/2023</a:t>
             </a:fld>
             <a:endParaRPr lang="en-US"/>
           </a:p>
@@ -1964,7 +1991,7 @@
           <a:p>
             <a:fld id="{ACA28E0F-F992-422F-B1E4-A67EB2895762}" type="datetimeFigureOut">
               <a:rPr lang="en-US" smtClean="0"/>
-              <a:t>8/20/2023</a:t>
+              <a:t>8/31/2023</a:t>
             </a:fld>
             <a:endParaRPr lang="en-US"/>
           </a:p>
@@ -2077,7 +2104,7 @@
           <a:p>
             <a:fld id="{ACA28E0F-F992-422F-B1E4-A67EB2895762}" type="datetimeFigureOut">
               <a:rPr lang="en-US" smtClean="0"/>
-              <a:t>8/20/2023</a:t>
+              <a:t>8/31/2023</a:t>
             </a:fld>
             <a:endParaRPr lang="en-US"/>
           </a:p>
@@ -2388,7 +2415,7 @@
           <a:p>
             <a:fld id="{ACA28E0F-F992-422F-B1E4-A67EB2895762}" type="datetimeFigureOut">
               <a:rPr lang="en-US" smtClean="0"/>
-              <a:t>8/20/2023</a:t>
+              <a:t>8/31/2023</a:t>
             </a:fld>
             <a:endParaRPr lang="en-US"/>
           </a:p>
@@ -2676,7 +2703,7 @@
           <a:p>
             <a:fld id="{ACA28E0F-F992-422F-B1E4-A67EB2895762}" type="datetimeFigureOut">
               <a:rPr lang="en-US" smtClean="0"/>
-              <a:t>8/20/2023</a:t>
+              <a:t>8/31/2023</a:t>
             </a:fld>
             <a:endParaRPr lang="en-US"/>
           </a:p>
@@ -2917,7 +2944,7 @@
           <a:p>
             <a:fld id="{ACA28E0F-F992-422F-B1E4-A67EB2895762}" type="datetimeFigureOut">
               <a:rPr lang="en-US" smtClean="0"/>
-              <a:t>8/20/2023</a:t>
+              <a:t>8/31/2023</a:t>
             </a:fld>
             <a:endParaRPr lang="en-US"/>
           </a:p>
@@ -3320,6 +3347,20 @@
 <file path=ppt/slides/slide1.xml><?xml version="1.0" encoding="utf-8"?>
 <p:sld xmlns:a="http://schemas.openxmlformats.org/drawingml/2006/main" xmlns:r="http://schemas.openxmlformats.org/officeDocument/2006/relationships" xmlns:p="http://schemas.openxmlformats.org/presentationml/2006/main">
   <p:cSld>
+    <p:bg>
+      <p:bgPr>
+        <a:blipFill dpi="0" rotWithShape="1">
+          <a:blip r:embed="rId2">
+            <a:lum/>
+          </a:blip>
+          <a:srcRect/>
+          <a:stretch>
+            <a:fillRect l="26000" t="-24000" r="-26000" b="-24000"/>
+          </a:stretch>
+        </a:blipFill>
+        <a:effectLst/>
+      </p:bgPr>
+    </p:bg>
     <p:spTree>
       <p:nvGrpSpPr>
         <p:cNvPr id="1" name=""/>
@@ -3336,6 +3377,60 @@
       </p:grpSpPr>
       <p:sp>
         <p:nvSpPr>
+          <p:cNvPr id="6" name="Rectangle 5">
+            <a:extLst>
+              <a:ext uri="{FF2B5EF4-FFF2-40B4-BE49-F238E27FC236}">
+                <a16:creationId xmlns:a16="http://schemas.microsoft.com/office/drawing/2014/main" id="{92AF5105-6FB0-03BE-5786-ABA6558DB571}"/>
+              </a:ext>
+            </a:extLst>
+          </p:cNvPr>
+          <p:cNvSpPr/>
+          <p:nvPr/>
+        </p:nvSpPr>
+        <p:spPr>
+          <a:xfrm>
+            <a:off x="0" y="0"/>
+            <a:ext cx="3190875" cy="6858000"/>
+          </a:xfrm>
+          <a:prstGeom prst="rect">
+            <a:avLst/>
+          </a:prstGeom>
+          <a:solidFill>
+            <a:schemeClr val="tx1"/>
+          </a:solidFill>
+          <a:ln w="28575">
+            <a:solidFill>
+              <a:schemeClr val="tx1"/>
+            </a:solidFill>
+          </a:ln>
+        </p:spPr>
+        <p:style>
+          <a:lnRef idx="2">
+            <a:schemeClr val="accent1">
+              <a:shade val="15000"/>
+            </a:schemeClr>
+          </a:lnRef>
+          <a:fillRef idx="1">
+            <a:schemeClr val="accent1"/>
+          </a:fillRef>
+          <a:effectRef idx="0">
+            <a:schemeClr val="accent1"/>
+          </a:effectRef>
+          <a:fontRef idx="minor">
+            <a:schemeClr val="lt1"/>
+          </a:fontRef>
+        </p:style>
+        <p:txBody>
+          <a:bodyPr rtlCol="0" anchor="ctr"/>
+          <a:lstStyle/>
+          <a:p>
+            <a:pPr algn="ctr"/>
+            <a:endParaRPr lang="en-US"/>
+          </a:p>
+        </p:txBody>
+      </p:sp>
+      <p:sp>
+        <p:nvSpPr>
           <p:cNvPr id="2" name="Title 1">
             <a:extLst>
               <a:ext uri="{FF2B5EF4-FFF2-40B4-BE49-F238E27FC236}">
@@ -3352,18 +3447,29 @@
         </p:nvSpPr>
         <p:spPr>
           <a:xfrm>
-            <a:off x="1524000" y="2189165"/>
-            <a:ext cx="9144000" cy="2387600"/>
+            <a:off x="-285750" y="1219625"/>
+            <a:ext cx="7048500" cy="2387600"/>
           </a:xfrm>
+          <a:solidFill>
+            <a:srgbClr val="000000">
+              <a:alpha val="47843"/>
+            </a:srgbClr>
+          </a:solidFill>
         </p:spPr>
         <p:txBody>
           <a:bodyPr>
-            <a:normAutofit fontScale="90000"/>
+            <a:normAutofit/>
           </a:bodyPr>
           <a:lstStyle/>
           <a:p>
             <a:r>
-              <a:rPr lang="en-US" dirty="0"/>
+              <a:rPr lang="en-US" sz="4800" dirty="0">
+                <a:solidFill>
+                  <a:schemeClr val="bg1">
+                    <a:lumMod val="85000"/>
+                  </a:schemeClr>
+                </a:solidFill>
+              </a:rPr>
               <a:t>Introducing Quantum Computing to Computer Science Students</a:t>
             </a:r>
           </a:p>
@@ -3387,7 +3493,7 @@
         </p:nvSpPr>
         <p:spPr>
           <a:xfrm>
-            <a:off x="5293659" y="1739156"/>
+            <a:off x="2436159" y="994620"/>
             <a:ext cx="1604682" cy="450009"/>
           </a:xfrm>
         </p:spPr>
@@ -3398,14 +3504,32 @@
           <a:lstStyle/>
           <a:p>
             <a:r>
-              <a:rPr lang="en-US" sz="2800" dirty="0"/>
+              <a:rPr lang="en-US" sz="2800" u="sng" dirty="0">
+                <a:solidFill>
+                  <a:schemeClr val="bg1">
+                    <a:lumMod val="65000"/>
+                  </a:schemeClr>
+                </a:solidFill>
+              </a:rPr>
               <a:t>STEM </a:t>
             </a:r>
             <a:r>
-              <a:rPr lang="en-US" sz="2800" dirty="0" err="1"/>
+              <a:rPr lang="en-US" sz="2800" u="sng" dirty="0" err="1">
+                <a:solidFill>
+                  <a:schemeClr val="bg1">
+                    <a:lumMod val="65000"/>
+                  </a:schemeClr>
+                </a:solidFill>
+              </a:rPr>
               <a:t>REx</a:t>
             </a:r>
-            <a:endParaRPr lang="en-US" sz="2800" dirty="0"/>
+            <a:endParaRPr lang="en-US" sz="2800" u="sng" dirty="0">
+              <a:solidFill>
+                <a:schemeClr val="bg1">
+                  <a:lumMod val="65000"/>
+                </a:schemeClr>
+              </a:solidFill>
+            </a:endParaRPr>
           </a:p>
         </p:txBody>
       </p:sp>
@@ -3425,8 +3549,8 @@
         </p:nvSpPr>
         <p:spPr>
           <a:xfrm>
-            <a:off x="1524000" y="4870269"/>
-            <a:ext cx="9144000" cy="450009"/>
+            <a:off x="1047750" y="4710160"/>
+            <a:ext cx="4381500" cy="450009"/>
           </a:xfrm>
           <a:prstGeom prst="rect">
             <a:avLst/>
@@ -3602,7 +3726,21 @@
           </a:lstStyle>
           <a:p>
             <a:r>
-              <a:rPr lang="en-US" sz="2800" dirty="0"/>
+              <a:rPr lang="en-US" sz="2800" dirty="0">
+                <a:solidFill>
+                  <a:schemeClr val="bg1">
+                    <a:lumMod val="65000"/>
+                  </a:schemeClr>
+                </a:solidFill>
+              </a:rPr>
+              <a:t>Presented by </a:t>
+            </a:r>
+            <a:r>
+              <a:rPr lang="en-US" sz="2800" b="1" dirty="0">
+                <a:solidFill>
+                  <a:schemeClr val="bg1"/>
+                </a:solidFill>
+              </a:rPr>
               <a:t>Nole Stites</a:t>
             </a:r>
           </a:p>
@@ -3621,9 +3759,19 @@
 </p:sld>
 </file>
 
-<file path=ppt/slides/slide2.xml><?xml version="1.0" encoding="utf-8"?>
+<file path=ppt/slides/slide10.xml><?xml version="1.0" encoding="utf-8"?>
 <p:sld xmlns:a="http://schemas.openxmlformats.org/drawingml/2006/main" xmlns:r="http://schemas.openxmlformats.org/officeDocument/2006/relationships" xmlns:p="http://schemas.openxmlformats.org/presentationml/2006/main">
   <p:cSld>
+    <p:bg>
+      <p:bgPr>
+        <a:solidFill>
+          <a:schemeClr val="bg2">
+            <a:lumMod val="75000"/>
+          </a:schemeClr>
+        </a:solidFill>
+        <a:effectLst/>
+      </p:bgPr>
+    </p:bg>
     <p:spTree>
       <p:nvGrpSpPr>
         <p:cNvPr id="1" name=""/>
@@ -3643,7 +3791,7 @@
           <p:cNvPr id="2" name="Title 1">
             <a:extLst>
               <a:ext uri="{FF2B5EF4-FFF2-40B4-BE49-F238E27FC236}">
-                <a16:creationId xmlns:a16="http://schemas.microsoft.com/office/drawing/2014/main" id="{2D845714-F1E2-C7AE-7266-D93D41A1A5EC}"/>
+                <a16:creationId xmlns:a16="http://schemas.microsoft.com/office/drawing/2014/main" id="{76F6DE1B-EB60-5BB5-DA00-9288B73528CD}"/>
               </a:ext>
             </a:extLst>
           </p:cNvPr>
@@ -3661,7 +3809,7 @@
           <a:p>
             <a:r>
               <a:rPr lang="en-US" dirty="0"/>
-              <a:t>Goal</a:t>
+              <a:t>Sources</a:t>
             </a:r>
           </a:p>
         </p:txBody>
@@ -3671,7 +3819,7 @@
           <p:cNvPr id="3" name="Content Placeholder 2">
             <a:extLst>
               <a:ext uri="{FF2B5EF4-FFF2-40B4-BE49-F238E27FC236}">
-                <a16:creationId xmlns:a16="http://schemas.microsoft.com/office/drawing/2014/main" id="{2DF5C33F-5B2A-B092-048A-916335E6D2FF}"/>
+                <a16:creationId xmlns:a16="http://schemas.microsoft.com/office/drawing/2014/main" id="{94F68C2D-E4B1-FCF0-30FB-AC96684B1376}"/>
               </a:ext>
             </a:extLst>
           </p:cNvPr>
@@ -3684,26 +3832,84 @@
         </p:nvSpPr>
         <p:spPr/>
         <p:txBody>
-          <a:bodyPr/>
+          <a:bodyPr>
+            <a:normAutofit/>
+          </a:bodyPr>
           <a:lstStyle/>
           <a:p>
             <a:r>
-              <a:rPr lang="en-US" dirty="0"/>
-              <a:t>Research an effective, minimized quantum computing learning path for students that doesn’t involve linear algebra. </a:t>
-            </a:r>
-          </a:p>
-          <a:p>
-            <a:r>
-              <a:rPr lang="en-US" dirty="0"/>
-              <a:t>Prepare an introductory lecture on quantum computing to be presented to CS 418 students.</a:t>
-            </a:r>
+              <a:rPr lang="en-US" sz="2400" u="sng" dirty="0"/>
+              <a:t>IBM Quantum Field Guide</a:t>
+            </a:r>
+            <a:r>
+              <a:rPr lang="en-US" sz="2400" dirty="0"/>
+              <a:t>: </a:t>
+            </a:r>
+            <a:r>
+              <a:rPr lang="en-US" sz="1800" dirty="0"/>
+              <a:t>https://quantum-computing.ibm.com/lab/docs/iqx/guide</a:t>
+            </a:r>
+          </a:p>
+          <a:p>
+            <a:r>
+              <a:rPr lang="en-US" sz="2400" u="sng" dirty="0"/>
+              <a:t>Online lecture series</a:t>
+            </a:r>
+            <a:r>
+              <a:rPr lang="en-US" sz="2400" dirty="0"/>
+              <a:t>: </a:t>
+            </a:r>
+            <a:r>
+              <a:rPr lang="en-US" sz="1800" dirty="0"/>
+              <a:t>https://youtube.com/playlist?list=PLkespgaZN4gmu0nWNmfMflVRqw0VPkCGH</a:t>
+            </a:r>
+          </a:p>
+          <a:p>
+            <a:r>
+              <a:rPr lang="en-US" sz="2400" u="sng" dirty="0"/>
+              <a:t>Books</a:t>
+            </a:r>
+            <a:r>
+              <a:rPr lang="en-US" sz="2400" dirty="0"/>
+              <a:t>:</a:t>
+            </a:r>
+          </a:p>
+          <a:p>
+            <a:pPr marL="971550" lvl="1" indent="-514350">
+              <a:buFont typeface="+mj-lt"/>
+              <a:buAutoNum type="romanUcPeriod"/>
+            </a:pPr>
+            <a:r>
+              <a:rPr lang="en-US" sz="2000" dirty="0"/>
+              <a:t>“The Strange World of Quantum Mechanics” by Daniel F. </a:t>
+            </a:r>
+            <a:r>
+              <a:rPr lang="en-US" sz="2000" dirty="0" err="1"/>
+              <a:t>Styer</a:t>
+            </a:r>
+            <a:endParaRPr lang="en-US" sz="2000" dirty="0"/>
+          </a:p>
+          <a:p>
+            <a:pPr marL="971550" lvl="1" indent="-514350">
+              <a:buFont typeface="+mj-lt"/>
+              <a:buAutoNum type="romanUcPeriod"/>
+            </a:pPr>
+            <a:r>
+              <a:rPr lang="en-US" sz="2000" dirty="0"/>
+              <a:t>“An Introduction to Quantum Computing” by Phillip Kaye, Raymond Laflamme and Michele </a:t>
+            </a:r>
+            <a:r>
+              <a:rPr lang="en-US" sz="2000" dirty="0" err="1"/>
+              <a:t>Mosca</a:t>
+            </a:r>
+            <a:endParaRPr lang="en-US" sz="2000" dirty="0"/>
           </a:p>
         </p:txBody>
       </p:sp>
     </p:spTree>
     <p:extLst>
       <p:ext uri="{BB962C8B-B14F-4D97-AF65-F5344CB8AC3E}">
-        <p14:creationId xmlns:p14="http://schemas.microsoft.com/office/powerpoint/2010/main" val="614301458"/>
+        <p14:creationId xmlns:p14="http://schemas.microsoft.com/office/powerpoint/2010/main" val="823450303"/>
       </p:ext>
     </p:extLst>
   </p:cSld>
@@ -3713,9 +3919,19 @@
 </p:sld>
 </file>
 
-<file path=ppt/slides/slide3.xml><?xml version="1.0" encoding="utf-8"?>
+<file path=ppt/slides/slide2.xml><?xml version="1.0" encoding="utf-8"?>
 <p:sld xmlns:a="http://schemas.openxmlformats.org/drawingml/2006/main" xmlns:r="http://schemas.openxmlformats.org/officeDocument/2006/relationships" xmlns:p="http://schemas.openxmlformats.org/presentationml/2006/main">
   <p:cSld>
+    <p:bg>
+      <p:bgPr>
+        <a:solidFill>
+          <a:schemeClr val="bg2">
+            <a:lumMod val="75000"/>
+          </a:schemeClr>
+        </a:solidFill>
+        <a:effectLst/>
+      </p:bgPr>
+    </p:bg>
     <p:spTree>
       <p:nvGrpSpPr>
         <p:cNvPr id="1" name=""/>
@@ -3735,7 +3951,7 @@
           <p:cNvPr id="2" name="Title 1">
             <a:extLst>
               <a:ext uri="{FF2B5EF4-FFF2-40B4-BE49-F238E27FC236}">
-                <a16:creationId xmlns:a16="http://schemas.microsoft.com/office/drawing/2014/main" id="{2D845714-F1E2-C7AE-7266-D93D41A1A5EC}"/>
+                <a16:creationId xmlns:a16="http://schemas.microsoft.com/office/drawing/2014/main" id="{12E2EAA2-2AA8-3D60-1F3F-F8F1FC5E3105}"/>
               </a:ext>
             </a:extLst>
           </p:cNvPr>
@@ -3746,14 +3962,29 @@
             <p:ph type="title"/>
           </p:nvPr>
         </p:nvSpPr>
-        <p:spPr/>
+        <p:spPr>
+          <a:xfrm>
+            <a:off x="0" y="1"/>
+            <a:ext cx="12192000" cy="1285874"/>
+          </a:xfrm>
+          <a:solidFill>
+            <a:schemeClr val="tx1"/>
+          </a:solidFill>
+        </p:spPr>
         <p:txBody>
           <a:bodyPr/>
           <a:lstStyle/>
           <a:p>
-            <a:r>
-              <a:rPr lang="en-US" dirty="0"/>
-              <a:t>Quantum Computing</a:t>
+            <a:pPr algn="ctr"/>
+            <a:r>
+              <a:rPr lang="en-US" dirty="0">
+                <a:solidFill>
+                  <a:schemeClr val="bg1">
+                    <a:lumMod val="85000"/>
+                  </a:schemeClr>
+                </a:solidFill>
+              </a:rPr>
+              <a:t>What makes quantum computing interesting?</a:t>
             </a:r>
           </a:p>
         </p:txBody>
@@ -3763,7 +3994,7 @@
           <p:cNvPr id="3" name="Content Placeholder 2">
             <a:extLst>
               <a:ext uri="{FF2B5EF4-FFF2-40B4-BE49-F238E27FC236}">
-                <a16:creationId xmlns:a16="http://schemas.microsoft.com/office/drawing/2014/main" id="{2DF5C33F-5B2A-B092-048A-916335E6D2FF}"/>
+                <a16:creationId xmlns:a16="http://schemas.microsoft.com/office/drawing/2014/main" id="{F0EE3049-8F07-4D3C-A19E-8470FFCB380F}"/>
               </a:ext>
             </a:extLst>
           </p:cNvPr>
@@ -3774,59 +4005,725 @@
             <p:ph idx="1"/>
           </p:nvPr>
         </p:nvSpPr>
-        <p:spPr/>
-        <p:txBody>
-          <a:bodyPr/>
+        <p:spPr>
+          <a:xfrm>
+            <a:off x="322729" y="1497107"/>
+            <a:ext cx="11519647" cy="5056094"/>
+          </a:xfrm>
+        </p:spPr>
+        <p:txBody>
+          <a:bodyPr>
+            <a:normAutofit fontScale="55000" lnSpcReduction="20000"/>
+          </a:bodyPr>
           <a:lstStyle/>
           <a:p>
-            <a:r>
-              <a:rPr lang="en-US" u="sng" dirty="0"/>
-              <a:t>The Problem</a:t>
-            </a:r>
-            <a:r>
-              <a:rPr lang="en-US" dirty="0"/>
-              <a:t>: to teach introductory quantum computing to students who may not know linear algebra.</a:t>
-            </a:r>
-          </a:p>
-          <a:p>
-            <a:r>
-              <a:rPr lang="en-US" u="sng" dirty="0"/>
-              <a:t>Why It’s Interesting</a:t>
-            </a:r>
-            <a:r>
-              <a:rPr lang="en-US" dirty="0"/>
-              <a:t>: quantum computing is a newly-rising industry with exciting possibilities due to the massive computational power of quantum computers (elaborate, of course).</a:t>
-            </a:r>
-          </a:p>
-          <a:p>
-            <a:r>
-              <a:rPr lang="en-US" u="sng" dirty="0"/>
-              <a:t>Why It’s Hard</a:t>
-            </a:r>
-            <a:r>
-              <a:rPr lang="en-US" dirty="0"/>
-              <a:t>: quantum computing is hard to teach due it the strange, weird nature of quantum mechanics.</a:t>
-            </a:r>
-            <a:endParaRPr lang="en-US" u="sng" dirty="0"/>
+            <a:pPr marL="514350" indent="-514350">
+              <a:lnSpc>
+                <a:spcPct val="120000"/>
+              </a:lnSpc>
+              <a:buFont typeface="+mj-lt"/>
+              <a:buAutoNum type="arabicPeriod"/>
+            </a:pPr>
+            <a:r>
+              <a:rPr lang="en-US" sz="3800" dirty="0"/>
+              <a:t>Quantum computers have a massive increase in computational power compared to classical computers.</a:t>
+            </a:r>
+          </a:p>
+          <a:p>
+            <a:pPr lvl="1">
+              <a:lnSpc>
+                <a:spcPct val="120000"/>
+              </a:lnSpc>
+              <a:buFont typeface="Wingdings" panose="05000000000000000000" pitchFamily="2" charset="2"/>
+              <a:buChar char="Ø"/>
+            </a:pPr>
+            <a:r>
+              <a:rPr lang="en-US" sz="2900" dirty="0"/>
+              <a:t>Can solve many complex problems in a reasonable amount of time, unlike classic computers.</a:t>
+            </a:r>
+          </a:p>
+          <a:p>
+            <a:pPr lvl="1">
+              <a:lnSpc>
+                <a:spcPct val="120000"/>
+              </a:lnSpc>
+              <a:buFont typeface="Wingdings" panose="05000000000000000000" pitchFamily="2" charset="2"/>
+              <a:buChar char="Ø"/>
+            </a:pPr>
+            <a:r>
+              <a:rPr lang="en-US" sz="2900" dirty="0"/>
+              <a:t>Classical computers can only represent one state at a time.</a:t>
+            </a:r>
+          </a:p>
+          <a:p>
+            <a:pPr lvl="1">
+              <a:lnSpc>
+                <a:spcPct val="120000"/>
+              </a:lnSpc>
+              <a:buFont typeface="Wingdings" panose="05000000000000000000" pitchFamily="2" charset="2"/>
+              <a:buChar char="Ø"/>
+            </a:pPr>
+            <a:r>
+              <a:rPr lang="en-US" sz="2900" dirty="0"/>
+              <a:t>Quantum computers can represent exponentially many states at once.</a:t>
+            </a:r>
+          </a:p>
+          <a:p>
+            <a:pPr marL="457200" lvl="1" indent="0">
+              <a:lnSpc>
+                <a:spcPct val="120000"/>
+              </a:lnSpc>
+              <a:buNone/>
+            </a:pPr>
+            <a:endParaRPr lang="en-US" dirty="0"/>
+          </a:p>
+          <a:p>
+            <a:pPr marL="514350" indent="-514350">
+              <a:lnSpc>
+                <a:spcPct val="120000"/>
+              </a:lnSpc>
+              <a:buFont typeface="+mj-lt"/>
+              <a:buAutoNum type="arabicPeriod"/>
+            </a:pPr>
+            <a:r>
+              <a:rPr lang="en-US" sz="3800" dirty="0"/>
+              <a:t>It has important applications in cyber security.</a:t>
+            </a:r>
+          </a:p>
+          <a:p>
+            <a:pPr lvl="1">
+              <a:lnSpc>
+                <a:spcPct val="120000"/>
+              </a:lnSpc>
+              <a:buFont typeface="Wingdings" panose="05000000000000000000" pitchFamily="2" charset="2"/>
+              <a:buChar char="Ø"/>
+            </a:pPr>
+            <a:r>
+              <a:rPr lang="en-US" sz="2900" dirty="0"/>
+              <a:t>Can improve the likelihood of stopping cyber attacks before they happen.</a:t>
+            </a:r>
+          </a:p>
+          <a:p>
+            <a:pPr lvl="1">
+              <a:lnSpc>
+                <a:spcPct val="120000"/>
+              </a:lnSpc>
+              <a:buFont typeface="Wingdings" panose="05000000000000000000" pitchFamily="2" charset="2"/>
+              <a:buChar char="Ø"/>
+            </a:pPr>
+            <a:r>
+              <a:rPr lang="en-US" sz="2900" dirty="0"/>
+              <a:t>Can create even more secure systems.</a:t>
+            </a:r>
+          </a:p>
+          <a:p>
+            <a:pPr lvl="1">
+              <a:lnSpc>
+                <a:spcPct val="120000"/>
+              </a:lnSpc>
+              <a:buFont typeface="Wingdings" panose="05000000000000000000" pitchFamily="2" charset="2"/>
+              <a:buChar char="Ø"/>
+            </a:pPr>
+            <a:r>
+              <a:rPr lang="en-US" sz="2900" dirty="0"/>
+              <a:t>Downside: it would create new vulnerabilities to be fixed.</a:t>
+            </a:r>
+          </a:p>
+          <a:p>
+            <a:pPr marL="457200" lvl="1" indent="0">
+              <a:lnSpc>
+                <a:spcPct val="120000"/>
+              </a:lnSpc>
+              <a:buNone/>
+            </a:pPr>
+            <a:endParaRPr lang="en-US" dirty="0"/>
+          </a:p>
+          <a:p>
+            <a:pPr marL="514350" indent="-514350">
+              <a:lnSpc>
+                <a:spcPct val="120000"/>
+              </a:lnSpc>
+              <a:buFont typeface="+mj-lt"/>
+              <a:buAutoNum type="arabicPeriod"/>
+            </a:pPr>
+            <a:r>
+              <a:rPr lang="en-US" sz="3800" dirty="0"/>
+              <a:t>It uses quantum mechanics, a strange yet fascinating new area of study for computer scientists.</a:t>
+            </a:r>
+          </a:p>
+          <a:p>
+            <a:pPr lvl="1">
+              <a:lnSpc>
+                <a:spcPct val="120000"/>
+              </a:lnSpc>
+              <a:buFont typeface="Wingdings" panose="05000000000000000000" pitchFamily="2" charset="2"/>
+              <a:buChar char="Ø"/>
+            </a:pPr>
+            <a:r>
+              <a:rPr lang="en-US" sz="2900" dirty="0"/>
+              <a:t>IBM, Google, Microsoft, and many more are all working to advance quantum computing research.</a:t>
+            </a:r>
+          </a:p>
+          <a:p>
+            <a:pPr lvl="1">
+              <a:lnSpc>
+                <a:spcPct val="120000"/>
+              </a:lnSpc>
+              <a:buFont typeface="Wingdings" panose="05000000000000000000" pitchFamily="2" charset="2"/>
+              <a:buChar char="Ø"/>
+            </a:pPr>
+            <a:r>
+              <a:rPr lang="en-US" sz="2900" dirty="0"/>
+              <a:t>The title slide image is IBM’s quantum computer called System One.</a:t>
+            </a:r>
+          </a:p>
+          <a:p>
+            <a:pPr>
+              <a:lnSpc>
+                <a:spcPct val="120000"/>
+              </a:lnSpc>
+            </a:pPr>
+            <a:endParaRPr lang="en-US" dirty="0"/>
+          </a:p>
+        </p:txBody>
+      </p:sp>
+      <p:sp>
+        <p:nvSpPr>
+          <p:cNvPr id="4" name="TextBox 3">
+            <a:extLst>
+              <a:ext uri="{FF2B5EF4-FFF2-40B4-BE49-F238E27FC236}">
+                <a16:creationId xmlns:a16="http://schemas.microsoft.com/office/drawing/2014/main" id="{9041472F-716F-69F5-602F-48342F9590A9}"/>
+              </a:ext>
+            </a:extLst>
+          </p:cNvPr>
+          <p:cNvSpPr txBox="1"/>
+          <p:nvPr/>
+        </p:nvSpPr>
+        <p:spPr>
+          <a:xfrm>
+            <a:off x="134471" y="1497106"/>
+            <a:ext cx="519953" cy="932329"/>
+          </a:xfrm>
+          <a:prstGeom prst="rect">
+            <a:avLst/>
+          </a:prstGeom>
+          <a:noFill/>
+        </p:spPr>
+        <p:txBody>
+          <a:bodyPr wrap="square" rtlCol="0">
+            <a:spAutoFit/>
+          </a:bodyPr>
+          <a:lstStyle/>
+          <a:p>
+            <a:endParaRPr lang="en-US" dirty="0"/>
           </a:p>
         </p:txBody>
       </p:sp>
     </p:spTree>
     <p:extLst>
       <p:ext uri="{BB962C8B-B14F-4D97-AF65-F5344CB8AC3E}">
-        <p14:creationId xmlns:p14="http://schemas.microsoft.com/office/powerpoint/2010/main" val="3342253483"/>
+        <p14:creationId xmlns:p14="http://schemas.microsoft.com/office/powerpoint/2010/main" val="2615321930"/>
       </p:ext>
     </p:extLst>
   </p:cSld>
   <p:clrMapOvr>
     <a:masterClrMapping/>
   </p:clrMapOvr>
+  <p:timing>
+    <p:tnLst>
+      <p:par>
+        <p:cTn id="1" dur="indefinite" restart="never" nodeType="tmRoot">
+          <p:childTnLst>
+            <p:seq concurrent="1" nextAc="seek">
+              <p:cTn id="2" dur="indefinite" nodeType="mainSeq">
+                <p:childTnLst>
+                  <p:par>
+                    <p:cTn id="3" fill="hold">
+                      <p:stCondLst>
+                        <p:cond delay="indefinite"/>
+                      </p:stCondLst>
+                      <p:childTnLst>
+                        <p:par>
+                          <p:cTn id="4" fill="hold">
+                            <p:stCondLst>
+                              <p:cond delay="0"/>
+                            </p:stCondLst>
+                            <p:childTnLst>
+                              <p:par>
+                                <p:cTn id="5" presetID="1" presetClass="entr" presetSubtype="0" fill="hold" nodeType="clickEffect">
+                                  <p:stCondLst>
+                                    <p:cond delay="0"/>
+                                  </p:stCondLst>
+                                  <p:childTnLst>
+                                    <p:set>
+                                      <p:cBhvr>
+                                        <p:cTn id="6" dur="1" fill="hold">
+                                          <p:stCondLst>
+                                            <p:cond delay="0"/>
+                                          </p:stCondLst>
+                                        </p:cTn>
+                                        <p:tgtEl>
+                                          <p:spTgt spid="3">
+                                            <p:txEl>
+                                              <p:pRg st="0" end="0"/>
+                                            </p:txEl>
+                                          </p:spTgt>
+                                        </p:tgtEl>
+                                        <p:attrNameLst>
+                                          <p:attrName>style.visibility</p:attrName>
+                                        </p:attrNameLst>
+                                      </p:cBhvr>
+                                      <p:to>
+                                        <p:strVal val="visible"/>
+                                      </p:to>
+                                    </p:set>
+                                  </p:childTnLst>
+                                </p:cTn>
+                              </p:par>
+                            </p:childTnLst>
+                          </p:cTn>
+                        </p:par>
+                      </p:childTnLst>
+                    </p:cTn>
+                  </p:par>
+                  <p:par>
+                    <p:cTn id="7" fill="hold">
+                      <p:stCondLst>
+                        <p:cond delay="indefinite"/>
+                      </p:stCondLst>
+                      <p:childTnLst>
+                        <p:par>
+                          <p:cTn id="8" fill="hold">
+                            <p:stCondLst>
+                              <p:cond delay="0"/>
+                            </p:stCondLst>
+                            <p:childTnLst>
+                              <p:par>
+                                <p:cTn id="9" presetID="1" presetClass="entr" presetSubtype="0" fill="hold" nodeType="clickEffect">
+                                  <p:stCondLst>
+                                    <p:cond delay="0"/>
+                                  </p:stCondLst>
+                                  <p:childTnLst>
+                                    <p:set>
+                                      <p:cBhvr>
+                                        <p:cTn id="10" dur="1" fill="hold">
+                                          <p:stCondLst>
+                                            <p:cond delay="0"/>
+                                          </p:stCondLst>
+                                        </p:cTn>
+                                        <p:tgtEl>
+                                          <p:spTgt spid="3">
+                                            <p:txEl>
+                                              <p:pRg st="1" end="1"/>
+                                            </p:txEl>
+                                          </p:spTgt>
+                                        </p:tgtEl>
+                                        <p:attrNameLst>
+                                          <p:attrName>style.visibility</p:attrName>
+                                        </p:attrNameLst>
+                                      </p:cBhvr>
+                                      <p:to>
+                                        <p:strVal val="visible"/>
+                                      </p:to>
+                                    </p:set>
+                                  </p:childTnLst>
+                                </p:cTn>
+                              </p:par>
+                              <p:par>
+                                <p:cTn id="11" presetID="1" presetClass="entr" presetSubtype="0" fill="hold" nodeType="withEffect">
+                                  <p:stCondLst>
+                                    <p:cond delay="0"/>
+                                  </p:stCondLst>
+                                  <p:childTnLst>
+                                    <p:set>
+                                      <p:cBhvr>
+                                        <p:cTn id="12" dur="1" fill="hold">
+                                          <p:stCondLst>
+                                            <p:cond delay="0"/>
+                                          </p:stCondLst>
+                                        </p:cTn>
+                                        <p:tgtEl>
+                                          <p:spTgt spid="3">
+                                            <p:txEl>
+                                              <p:pRg st="2" end="2"/>
+                                            </p:txEl>
+                                          </p:spTgt>
+                                        </p:tgtEl>
+                                        <p:attrNameLst>
+                                          <p:attrName>style.visibility</p:attrName>
+                                        </p:attrNameLst>
+                                      </p:cBhvr>
+                                      <p:to>
+                                        <p:strVal val="visible"/>
+                                      </p:to>
+                                    </p:set>
+                                  </p:childTnLst>
+                                </p:cTn>
+                              </p:par>
+                              <p:par>
+                                <p:cTn id="13" presetID="1" presetClass="entr" presetSubtype="0" fill="hold" nodeType="withEffect">
+                                  <p:stCondLst>
+                                    <p:cond delay="0"/>
+                                  </p:stCondLst>
+                                  <p:childTnLst>
+                                    <p:set>
+                                      <p:cBhvr>
+                                        <p:cTn id="14" dur="1" fill="hold">
+                                          <p:stCondLst>
+                                            <p:cond delay="0"/>
+                                          </p:stCondLst>
+                                        </p:cTn>
+                                        <p:tgtEl>
+                                          <p:spTgt spid="3">
+                                            <p:txEl>
+                                              <p:pRg st="3" end="3"/>
+                                            </p:txEl>
+                                          </p:spTgt>
+                                        </p:tgtEl>
+                                        <p:attrNameLst>
+                                          <p:attrName>style.visibility</p:attrName>
+                                        </p:attrNameLst>
+                                      </p:cBhvr>
+                                      <p:to>
+                                        <p:strVal val="visible"/>
+                                      </p:to>
+                                    </p:set>
+                                  </p:childTnLst>
+                                </p:cTn>
+                              </p:par>
+                            </p:childTnLst>
+                          </p:cTn>
+                        </p:par>
+                      </p:childTnLst>
+                    </p:cTn>
+                  </p:par>
+                  <p:par>
+                    <p:cTn id="15" fill="hold">
+                      <p:stCondLst>
+                        <p:cond delay="indefinite"/>
+                      </p:stCondLst>
+                      <p:childTnLst>
+                        <p:par>
+                          <p:cTn id="16" fill="hold">
+                            <p:stCondLst>
+                              <p:cond delay="0"/>
+                            </p:stCondLst>
+                            <p:childTnLst>
+                              <p:par>
+                                <p:cTn id="17" presetID="1" presetClass="entr" presetSubtype="0" fill="hold" nodeType="clickEffect">
+                                  <p:stCondLst>
+                                    <p:cond delay="0"/>
+                                  </p:stCondLst>
+                                  <p:childTnLst>
+                                    <p:set>
+                                      <p:cBhvr>
+                                        <p:cTn id="18" dur="1" fill="hold">
+                                          <p:stCondLst>
+                                            <p:cond delay="0"/>
+                                          </p:stCondLst>
+                                        </p:cTn>
+                                        <p:tgtEl>
+                                          <p:spTgt spid="3">
+                                            <p:txEl>
+                                              <p:pRg st="5" end="5"/>
+                                            </p:txEl>
+                                          </p:spTgt>
+                                        </p:tgtEl>
+                                        <p:attrNameLst>
+                                          <p:attrName>style.visibility</p:attrName>
+                                        </p:attrNameLst>
+                                      </p:cBhvr>
+                                      <p:to>
+                                        <p:strVal val="visible"/>
+                                      </p:to>
+                                    </p:set>
+                                  </p:childTnLst>
+                                </p:cTn>
+                              </p:par>
+                            </p:childTnLst>
+                          </p:cTn>
+                        </p:par>
+                      </p:childTnLst>
+                    </p:cTn>
+                  </p:par>
+                  <p:par>
+                    <p:cTn id="19" fill="hold">
+                      <p:stCondLst>
+                        <p:cond delay="indefinite"/>
+                      </p:stCondLst>
+                      <p:childTnLst>
+                        <p:par>
+                          <p:cTn id="20" fill="hold">
+                            <p:stCondLst>
+                              <p:cond delay="0"/>
+                            </p:stCondLst>
+                            <p:childTnLst>
+                              <p:par>
+                                <p:cTn id="21" presetID="1" presetClass="entr" presetSubtype="0" fill="hold" nodeType="clickEffect">
+                                  <p:stCondLst>
+                                    <p:cond delay="0"/>
+                                  </p:stCondLst>
+                                  <p:childTnLst>
+                                    <p:set>
+                                      <p:cBhvr>
+                                        <p:cTn id="22" dur="1" fill="hold">
+                                          <p:stCondLst>
+                                            <p:cond delay="0"/>
+                                          </p:stCondLst>
+                                        </p:cTn>
+                                        <p:tgtEl>
+                                          <p:spTgt spid="3">
+                                            <p:txEl>
+                                              <p:pRg st="6" end="6"/>
+                                            </p:txEl>
+                                          </p:spTgt>
+                                        </p:tgtEl>
+                                        <p:attrNameLst>
+                                          <p:attrName>style.visibility</p:attrName>
+                                        </p:attrNameLst>
+                                      </p:cBhvr>
+                                      <p:to>
+                                        <p:strVal val="visible"/>
+                                      </p:to>
+                                    </p:set>
+                                  </p:childTnLst>
+                                </p:cTn>
+                              </p:par>
+                              <p:par>
+                                <p:cTn id="23" presetID="1" presetClass="entr" presetSubtype="0" fill="hold" nodeType="withEffect">
+                                  <p:stCondLst>
+                                    <p:cond delay="0"/>
+                                  </p:stCondLst>
+                                  <p:childTnLst>
+                                    <p:set>
+                                      <p:cBhvr>
+                                        <p:cTn id="24" dur="1" fill="hold">
+                                          <p:stCondLst>
+                                            <p:cond delay="0"/>
+                                          </p:stCondLst>
+                                        </p:cTn>
+                                        <p:tgtEl>
+                                          <p:spTgt spid="3">
+                                            <p:txEl>
+                                              <p:pRg st="7" end="7"/>
+                                            </p:txEl>
+                                          </p:spTgt>
+                                        </p:tgtEl>
+                                        <p:attrNameLst>
+                                          <p:attrName>style.visibility</p:attrName>
+                                        </p:attrNameLst>
+                                      </p:cBhvr>
+                                      <p:to>
+                                        <p:strVal val="visible"/>
+                                      </p:to>
+                                    </p:set>
+                                  </p:childTnLst>
+                                </p:cTn>
+                              </p:par>
+                              <p:par>
+                                <p:cTn id="25" presetID="1" presetClass="entr" presetSubtype="0" fill="hold" nodeType="withEffect">
+                                  <p:stCondLst>
+                                    <p:cond delay="0"/>
+                                  </p:stCondLst>
+                                  <p:childTnLst>
+                                    <p:set>
+                                      <p:cBhvr>
+                                        <p:cTn id="26" dur="1" fill="hold">
+                                          <p:stCondLst>
+                                            <p:cond delay="0"/>
+                                          </p:stCondLst>
+                                        </p:cTn>
+                                        <p:tgtEl>
+                                          <p:spTgt spid="3">
+                                            <p:txEl>
+                                              <p:pRg st="8" end="8"/>
+                                            </p:txEl>
+                                          </p:spTgt>
+                                        </p:tgtEl>
+                                        <p:attrNameLst>
+                                          <p:attrName>style.visibility</p:attrName>
+                                        </p:attrNameLst>
+                                      </p:cBhvr>
+                                      <p:to>
+                                        <p:strVal val="visible"/>
+                                      </p:to>
+                                    </p:set>
+                                  </p:childTnLst>
+                                </p:cTn>
+                              </p:par>
+                            </p:childTnLst>
+                          </p:cTn>
+                        </p:par>
+                      </p:childTnLst>
+                    </p:cTn>
+                  </p:par>
+                  <p:par>
+                    <p:cTn id="27" fill="hold">
+                      <p:stCondLst>
+                        <p:cond delay="indefinite"/>
+                      </p:stCondLst>
+                      <p:childTnLst>
+                        <p:par>
+                          <p:cTn id="28" fill="hold">
+                            <p:stCondLst>
+                              <p:cond delay="0"/>
+                            </p:stCondLst>
+                            <p:childTnLst>
+                              <p:par>
+                                <p:cTn id="29" presetID="1" presetClass="entr" presetSubtype="0" fill="hold" nodeType="clickEffect">
+                                  <p:stCondLst>
+                                    <p:cond delay="0"/>
+                                  </p:stCondLst>
+                                  <p:childTnLst>
+                                    <p:set>
+                                      <p:cBhvr>
+                                        <p:cTn id="30" dur="1" fill="hold">
+                                          <p:stCondLst>
+                                            <p:cond delay="0"/>
+                                          </p:stCondLst>
+                                        </p:cTn>
+                                        <p:tgtEl>
+                                          <p:spTgt spid="3">
+                                            <p:txEl>
+                                              <p:pRg st="10" end="10"/>
+                                            </p:txEl>
+                                          </p:spTgt>
+                                        </p:tgtEl>
+                                        <p:attrNameLst>
+                                          <p:attrName>style.visibility</p:attrName>
+                                        </p:attrNameLst>
+                                      </p:cBhvr>
+                                      <p:to>
+                                        <p:strVal val="visible"/>
+                                      </p:to>
+                                    </p:set>
+                                  </p:childTnLst>
+                                </p:cTn>
+                              </p:par>
+                            </p:childTnLst>
+                          </p:cTn>
+                        </p:par>
+                      </p:childTnLst>
+                    </p:cTn>
+                  </p:par>
+                  <p:par>
+                    <p:cTn id="31" fill="hold">
+                      <p:stCondLst>
+                        <p:cond delay="indefinite"/>
+                      </p:stCondLst>
+                      <p:childTnLst>
+                        <p:par>
+                          <p:cTn id="32" fill="hold">
+                            <p:stCondLst>
+                              <p:cond delay="0"/>
+                            </p:stCondLst>
+                            <p:childTnLst>
+                              <p:par>
+                                <p:cTn id="33" presetID="1" presetClass="entr" presetSubtype="0" fill="hold" nodeType="clickEffect">
+                                  <p:stCondLst>
+                                    <p:cond delay="0"/>
+                                  </p:stCondLst>
+                                  <p:childTnLst>
+                                    <p:set>
+                                      <p:cBhvr>
+                                        <p:cTn id="34" dur="1" fill="hold">
+                                          <p:stCondLst>
+                                            <p:cond delay="0"/>
+                                          </p:stCondLst>
+                                        </p:cTn>
+                                        <p:tgtEl>
+                                          <p:spTgt spid="3">
+                                            <p:txEl>
+                                              <p:pRg st="11" end="11"/>
+                                            </p:txEl>
+                                          </p:spTgt>
+                                        </p:tgtEl>
+                                        <p:attrNameLst>
+                                          <p:attrName>style.visibility</p:attrName>
+                                        </p:attrNameLst>
+                                      </p:cBhvr>
+                                      <p:to>
+                                        <p:strVal val="visible"/>
+                                      </p:to>
+                                    </p:set>
+                                  </p:childTnLst>
+                                </p:cTn>
+                              </p:par>
+                              <p:par>
+                                <p:cTn id="35" presetID="1" presetClass="entr" presetSubtype="0" fill="hold" nodeType="withEffect">
+                                  <p:stCondLst>
+                                    <p:cond delay="0"/>
+                                  </p:stCondLst>
+                                  <p:childTnLst>
+                                    <p:set>
+                                      <p:cBhvr>
+                                        <p:cTn id="36" dur="1" fill="hold">
+                                          <p:stCondLst>
+                                            <p:cond delay="0"/>
+                                          </p:stCondLst>
+                                        </p:cTn>
+                                        <p:tgtEl>
+                                          <p:spTgt spid="3">
+                                            <p:txEl>
+                                              <p:pRg st="12" end="12"/>
+                                            </p:txEl>
+                                          </p:spTgt>
+                                        </p:tgtEl>
+                                        <p:attrNameLst>
+                                          <p:attrName>style.visibility</p:attrName>
+                                        </p:attrNameLst>
+                                      </p:cBhvr>
+                                      <p:to>
+                                        <p:strVal val="visible"/>
+                                      </p:to>
+                                    </p:set>
+                                  </p:childTnLst>
+                                </p:cTn>
+                              </p:par>
+                            </p:childTnLst>
+                          </p:cTn>
+                        </p:par>
+                      </p:childTnLst>
+                    </p:cTn>
+                  </p:par>
+                </p:childTnLst>
+              </p:cTn>
+              <p:prevCondLst>
+                <p:cond evt="onPrev" delay="0">
+                  <p:tgtEl>
+                    <p:sldTgt/>
+                  </p:tgtEl>
+                </p:cond>
+              </p:prevCondLst>
+              <p:nextCondLst>
+                <p:cond evt="onNext" delay="0">
+                  <p:tgtEl>
+                    <p:sldTgt/>
+                  </p:tgtEl>
+                </p:cond>
+              </p:nextCondLst>
+            </p:seq>
+          </p:childTnLst>
+        </p:cTn>
+      </p:par>
+    </p:tnLst>
+  </p:timing>
 </p:sld>
 </file>
 
-<file path=ppt/slides/slide4.xml><?xml version="1.0" encoding="utf-8"?>
+<file path=ppt/slides/slide3.xml><?xml version="1.0" encoding="utf-8"?>
 <p:sld xmlns:a="http://schemas.openxmlformats.org/drawingml/2006/main" xmlns:r="http://schemas.openxmlformats.org/officeDocument/2006/relationships" xmlns:p="http://schemas.openxmlformats.org/presentationml/2006/main">
   <p:cSld>
+    <p:bg>
+      <p:bgPr>
+        <a:solidFill>
+          <a:schemeClr val="bg2">
+            <a:lumMod val="75000"/>
+          </a:schemeClr>
+        </a:solidFill>
+        <a:effectLst/>
+      </p:bgPr>
+    </p:bg>
     <p:spTree>
       <p:nvGrpSpPr>
         <p:cNvPr id="1" name=""/>
@@ -3843,38 +4740,10 @@
       </p:grpSpPr>
       <p:sp>
         <p:nvSpPr>
-          <p:cNvPr id="2" name="Title 1">
-            <a:extLst>
-              <a:ext uri="{FF2B5EF4-FFF2-40B4-BE49-F238E27FC236}">
-                <a16:creationId xmlns:a16="http://schemas.microsoft.com/office/drawing/2014/main" id="{037EACEC-07BD-1D08-C19D-F2DFD4BF42CB}"/>
-              </a:ext>
-            </a:extLst>
-          </p:cNvPr>
-          <p:cNvSpPr>
-            <a:spLocks noGrp="1"/>
-          </p:cNvSpPr>
-          <p:nvPr>
-            <p:ph type="title"/>
-          </p:nvPr>
-        </p:nvSpPr>
-        <p:spPr/>
-        <p:txBody>
-          <a:bodyPr/>
-          <a:lstStyle/>
-          <a:p>
-            <a:r>
-              <a:rPr lang="en-US" dirty="0"/>
-              <a:t>Steps to achieve the goal</a:t>
-            </a:r>
-          </a:p>
-        </p:txBody>
-      </p:sp>
-      <p:sp>
-        <p:nvSpPr>
           <p:cNvPr id="3" name="Content Placeholder 2">
             <a:extLst>
               <a:ext uri="{FF2B5EF4-FFF2-40B4-BE49-F238E27FC236}">
-                <a16:creationId xmlns:a16="http://schemas.microsoft.com/office/drawing/2014/main" id="{B96F3094-7B2D-EF5D-C552-E2068123B7E9}"/>
+                <a16:creationId xmlns:a16="http://schemas.microsoft.com/office/drawing/2014/main" id="{2DF5C33F-5B2A-B092-048A-916335E6D2FF}"/>
               </a:ext>
             </a:extLst>
           </p:cNvPr>
@@ -3887,48 +4756,109 @@
         </p:nvSpPr>
         <p:spPr/>
         <p:txBody>
-          <a:bodyPr>
+          <a:bodyPr/>
+          <a:lstStyle/>
+          <a:p>
+            <a:pPr marL="0" indent="0">
+              <a:buNone/>
+            </a:pPr>
+            <a:r>
+              <a:rPr lang="en-US" dirty="0"/>
+              <a:t>A couple of problems arise when trying to teach quantum computing:</a:t>
+            </a:r>
+          </a:p>
+          <a:p>
+            <a:pPr marL="0" indent="0">
+              <a:buNone/>
+            </a:pPr>
+            <a:endParaRPr lang="en-US" dirty="0"/>
+          </a:p>
+          <a:p>
+            <a:pPr marL="514350" indent="-514350">
+              <a:buAutoNum type="arabicPeriod"/>
+            </a:pPr>
+            <a:r>
+              <a:rPr lang="en-US" dirty="0"/>
+              <a:t>The nature of quantum mechanics is strange and hard to grasp.</a:t>
+            </a:r>
+          </a:p>
+          <a:p>
+            <a:pPr marL="514350" indent="-514350">
+              <a:buAutoNum type="arabicPeriod"/>
+            </a:pPr>
+            <a:endParaRPr lang="en-US" dirty="0"/>
+          </a:p>
+          <a:p>
+            <a:pPr marL="514350" indent="-514350">
+              <a:buAutoNum type="arabicPeriod"/>
+            </a:pPr>
+            <a:r>
+              <a:rPr lang="en-US" dirty="0"/>
+              <a:t>Quantum computing relies heavily on linear algebra, a topic that most CS students may not know.</a:t>
+            </a:r>
+          </a:p>
+        </p:txBody>
+      </p:sp>
+      <p:sp>
+        <p:nvSpPr>
+          <p:cNvPr id="6" name="Title 1">
+            <a:extLst>
+              <a:ext uri="{FF2B5EF4-FFF2-40B4-BE49-F238E27FC236}">
+                <a16:creationId xmlns:a16="http://schemas.microsoft.com/office/drawing/2014/main" id="{8EECE951-5563-8A72-A2DF-81E68F3BECDB}"/>
+              </a:ext>
+            </a:extLst>
+          </p:cNvPr>
+          <p:cNvSpPr txBox="1">
+            <a:spLocks/>
+          </p:cNvSpPr>
+          <p:nvPr/>
+        </p:nvSpPr>
+        <p:spPr>
+          <a:xfrm>
+            <a:off x="0" y="1"/>
+            <a:ext cx="12192000" cy="1285874"/>
+          </a:xfrm>
+          <a:prstGeom prst="rect">
+            <a:avLst/>
+          </a:prstGeom>
+          <a:solidFill>
+            <a:schemeClr val="tx1"/>
+          </a:solidFill>
+        </p:spPr>
+        <p:txBody>
+          <a:bodyPr vert="horz" lIns="91440" tIns="45720" rIns="91440" bIns="45720" rtlCol="0" anchor="ctr">
             <a:normAutofit/>
           </a:bodyPr>
-          <a:lstStyle/>
-          <a:p>
-            <a:pPr marL="514350" indent="-514350">
-              <a:buFont typeface="+mj-lt"/>
-              <a:buAutoNum type="arabicPeriod"/>
-            </a:pPr>
-            <a:r>
-              <a:rPr lang="en-US" dirty="0"/>
-              <a:t>Learn quantum computing the traditional way.</a:t>
-            </a:r>
-          </a:p>
-          <a:p>
-            <a:pPr marL="514350" indent="-514350">
-              <a:buFont typeface="+mj-lt"/>
-              <a:buAutoNum type="arabicPeriod"/>
-            </a:pPr>
-            <a:r>
-              <a:rPr lang="en-US" dirty="0"/>
-              <a:t>Draft lecture outlines until the desired outline is found.</a:t>
-            </a:r>
-          </a:p>
-          <a:p>
-            <a:pPr marL="514350" indent="-514350">
-              <a:buFont typeface="+mj-lt"/>
-              <a:buAutoNum type="arabicPeriod"/>
-            </a:pPr>
-            <a:r>
-              <a:rPr lang="en-US" dirty="0"/>
-              <a:t>Encode my knowledge of quantum computing into a graph that follows the structure of the lecture outline.</a:t>
-            </a:r>
-          </a:p>
-          <a:p>
-            <a:pPr marL="514350" indent="-514350">
-              <a:buFont typeface="+mj-lt"/>
-              <a:buAutoNum type="arabicPeriod"/>
-            </a:pPr>
-            <a:r>
-              <a:rPr lang="en-US" dirty="0"/>
-              <a:t>Create a list of resources and exercises for students to use to expand on their knowledge.</a:t>
+          <a:lstStyle>
+            <a:lvl1pPr algn="l" defTabSz="914400" rtl="0" eaLnBrk="1" latinLnBrk="0" hangingPunct="1">
+              <a:lnSpc>
+                <a:spcPct val="90000"/>
+              </a:lnSpc>
+              <a:spcBef>
+                <a:spcPct val="0"/>
+              </a:spcBef>
+              <a:buNone/>
+              <a:defRPr sz="4400" kern="1200">
+                <a:solidFill>
+                  <a:schemeClr val="tx1"/>
+                </a:solidFill>
+                <a:latin typeface="+mj-lt"/>
+                <a:ea typeface="+mj-ea"/>
+                <a:cs typeface="+mj-cs"/>
+              </a:defRPr>
+            </a:lvl1pPr>
+          </a:lstStyle>
+          <a:p>
+            <a:pPr algn="ctr"/>
+            <a:r>
+              <a:rPr lang="en-US" dirty="0">
+                <a:solidFill>
+                  <a:schemeClr val="bg1">
+                    <a:lumMod val="85000"/>
+                  </a:schemeClr>
+                </a:solidFill>
+              </a:rPr>
+              <a:t>Quantum computing cont.</a:t>
             </a:r>
           </a:p>
         </p:txBody>
@@ -3936,19 +4866,157 @@
     </p:spTree>
     <p:extLst>
       <p:ext uri="{BB962C8B-B14F-4D97-AF65-F5344CB8AC3E}">
-        <p14:creationId xmlns:p14="http://schemas.microsoft.com/office/powerpoint/2010/main" val="765426797"/>
+        <p14:creationId xmlns:p14="http://schemas.microsoft.com/office/powerpoint/2010/main" val="3342253483"/>
       </p:ext>
     </p:extLst>
   </p:cSld>
   <p:clrMapOvr>
     <a:masterClrMapping/>
   </p:clrMapOvr>
+  <p:timing>
+    <p:tnLst>
+      <p:par>
+        <p:cTn id="1" dur="indefinite" restart="never" nodeType="tmRoot">
+          <p:childTnLst>
+            <p:seq concurrent="1" nextAc="seek">
+              <p:cTn id="2" dur="indefinite" nodeType="mainSeq">
+                <p:childTnLst>
+                  <p:par>
+                    <p:cTn id="3" fill="hold">
+                      <p:stCondLst>
+                        <p:cond delay="indefinite"/>
+                      </p:stCondLst>
+                      <p:childTnLst>
+                        <p:par>
+                          <p:cTn id="4" fill="hold">
+                            <p:stCondLst>
+                              <p:cond delay="0"/>
+                            </p:stCondLst>
+                            <p:childTnLst>
+                              <p:par>
+                                <p:cTn id="5" presetID="1" presetClass="entr" presetSubtype="0" fill="hold" nodeType="clickEffect">
+                                  <p:stCondLst>
+                                    <p:cond delay="0"/>
+                                  </p:stCondLst>
+                                  <p:childTnLst>
+                                    <p:set>
+                                      <p:cBhvr>
+                                        <p:cTn id="6" dur="1" fill="hold">
+                                          <p:stCondLst>
+                                            <p:cond delay="0"/>
+                                          </p:stCondLst>
+                                        </p:cTn>
+                                        <p:tgtEl>
+                                          <p:spTgt spid="3">
+                                            <p:txEl>
+                                              <p:pRg st="2" end="2"/>
+                                            </p:txEl>
+                                          </p:spTgt>
+                                        </p:tgtEl>
+                                        <p:attrNameLst>
+                                          <p:attrName>style.visibility</p:attrName>
+                                        </p:attrNameLst>
+                                      </p:cBhvr>
+                                      <p:to>
+                                        <p:strVal val="visible"/>
+                                      </p:to>
+                                    </p:set>
+                                  </p:childTnLst>
+                                </p:cTn>
+                              </p:par>
+                            </p:childTnLst>
+                          </p:cTn>
+                        </p:par>
+                      </p:childTnLst>
+                    </p:cTn>
+                  </p:par>
+                  <p:par>
+                    <p:cTn id="7" fill="hold">
+                      <p:stCondLst>
+                        <p:cond delay="indefinite"/>
+                      </p:stCondLst>
+                      <p:childTnLst>
+                        <p:par>
+                          <p:cTn id="8" fill="hold">
+                            <p:stCondLst>
+                              <p:cond delay="0"/>
+                            </p:stCondLst>
+                            <p:childTnLst>
+                              <p:par>
+                                <p:cTn id="9" presetID="1" presetClass="entr" presetSubtype="0" fill="hold" nodeType="clickEffect">
+                                  <p:stCondLst>
+                                    <p:cond delay="0"/>
+                                  </p:stCondLst>
+                                  <p:childTnLst>
+                                    <p:set>
+                                      <p:cBhvr>
+                                        <p:cTn id="10" dur="1" fill="hold">
+                                          <p:stCondLst>
+                                            <p:cond delay="0"/>
+                                          </p:stCondLst>
+                                        </p:cTn>
+                                        <p:tgtEl>
+                                          <p:spTgt spid="3">
+                                            <p:txEl>
+                                              <p:pRg st="4" end="4"/>
+                                            </p:txEl>
+                                          </p:spTgt>
+                                        </p:tgtEl>
+                                        <p:attrNameLst>
+                                          <p:attrName>style.visibility</p:attrName>
+                                        </p:attrNameLst>
+                                      </p:cBhvr>
+                                      <p:to>
+                                        <p:strVal val="visible"/>
+                                      </p:to>
+                                    </p:set>
+                                  </p:childTnLst>
+                                </p:cTn>
+                              </p:par>
+                            </p:childTnLst>
+                          </p:cTn>
+                        </p:par>
+                      </p:childTnLst>
+                    </p:cTn>
+                  </p:par>
+                </p:childTnLst>
+              </p:cTn>
+              <p:prevCondLst>
+                <p:cond evt="onPrev" delay="0">
+                  <p:tgtEl>
+                    <p:sldTgt/>
+                  </p:tgtEl>
+                </p:cond>
+              </p:prevCondLst>
+              <p:nextCondLst>
+                <p:cond evt="onNext" delay="0">
+                  <p:tgtEl>
+                    <p:sldTgt/>
+                  </p:tgtEl>
+                </p:cond>
+              </p:nextCondLst>
+            </p:seq>
+          </p:childTnLst>
+        </p:cTn>
+      </p:par>
+    </p:tnLst>
+  </p:timing>
 </p:sld>
 </file>
 
-<file path=ppt/slides/slide5.xml><?xml version="1.0" encoding="utf-8"?>
+<file path=ppt/slides/slide4.xml><?xml version="1.0" encoding="utf-8"?>
 <p:sld xmlns:a="http://schemas.openxmlformats.org/drawingml/2006/main" xmlns:r="http://schemas.openxmlformats.org/officeDocument/2006/relationships" xmlns:p="http://schemas.openxmlformats.org/presentationml/2006/main">
   <p:cSld>
+    <p:bg>
+      <p:bgPr>
+        <a:solidFill>
+          <a:schemeClr val="bg2">
+            <a:lumMod val="75000"/>
+          </a:schemeClr>
+        </a:solidFill>
+        <a:effectLst/>
+      </p:bgPr>
+    </p:bg>
     <p:spTree>
       <p:nvGrpSpPr>
         <p:cNvPr id="1" name=""/>
@@ -3965,38 +5033,10 @@
       </p:grpSpPr>
       <p:sp>
         <p:nvSpPr>
-          <p:cNvPr id="2" name="Title 1">
-            <a:extLst>
-              <a:ext uri="{FF2B5EF4-FFF2-40B4-BE49-F238E27FC236}">
-                <a16:creationId xmlns:a16="http://schemas.microsoft.com/office/drawing/2014/main" id="{E248A879-B2CC-95F5-0ACA-A5C3D504BB20}"/>
-              </a:ext>
-            </a:extLst>
-          </p:cNvPr>
-          <p:cNvSpPr>
-            <a:spLocks noGrp="1"/>
-          </p:cNvSpPr>
-          <p:nvPr>
-            <p:ph type="title"/>
-          </p:nvPr>
-        </p:nvSpPr>
-        <p:spPr/>
-        <p:txBody>
-          <a:bodyPr/>
-          <a:lstStyle/>
-          <a:p>
-            <a:r>
-              <a:rPr lang="en-US" dirty="0"/>
-              <a:t>Step 1: Learn Quantum Computing</a:t>
-            </a:r>
-          </a:p>
-        </p:txBody>
-      </p:sp>
-      <p:sp>
-        <p:nvSpPr>
           <p:cNvPr id="3" name="Content Placeholder 2">
             <a:extLst>
               <a:ext uri="{FF2B5EF4-FFF2-40B4-BE49-F238E27FC236}">
-                <a16:creationId xmlns:a16="http://schemas.microsoft.com/office/drawing/2014/main" id="{10D2AD1B-68D6-BD46-62DC-44A454FFC79F}"/>
+                <a16:creationId xmlns:a16="http://schemas.microsoft.com/office/drawing/2014/main" id="{2DF5C33F-5B2A-B092-048A-916335E6D2FF}"/>
               </a:ext>
             </a:extLst>
           </p:cNvPr>
@@ -4007,223 +5047,248 @@
             <p:ph idx="1"/>
           </p:nvPr>
         </p:nvSpPr>
+        <p:spPr/>
+        <p:txBody>
+          <a:bodyPr/>
+          <a:lstStyle/>
+          <a:p>
+            <a:r>
+              <a:rPr lang="en-US" dirty="0"/>
+              <a:t>Research an effective, minimized quantum computing learning path for students that doesn’t involve linear algebra. </a:t>
+            </a:r>
+          </a:p>
+          <a:p>
+            <a:pPr marL="0" indent="0">
+              <a:buNone/>
+            </a:pPr>
+            <a:endParaRPr lang="en-US" dirty="0"/>
+          </a:p>
+          <a:p>
+            <a:r>
+              <a:rPr lang="en-US" dirty="0"/>
+              <a:t>Prepare an introductory lecture on quantum computing to be presented to CS 418 students.</a:t>
+            </a:r>
+          </a:p>
+        </p:txBody>
+      </p:sp>
+      <p:sp>
+        <p:nvSpPr>
+          <p:cNvPr id="7" name="Title 1">
+            <a:extLst>
+              <a:ext uri="{FF2B5EF4-FFF2-40B4-BE49-F238E27FC236}">
+                <a16:creationId xmlns:a16="http://schemas.microsoft.com/office/drawing/2014/main" id="{85920511-62A5-B7C2-7FCE-2EEE2EB72421}"/>
+              </a:ext>
+            </a:extLst>
+          </p:cNvPr>
+          <p:cNvSpPr txBox="1">
+            <a:spLocks/>
+          </p:cNvSpPr>
+          <p:nvPr/>
+        </p:nvSpPr>
         <p:spPr>
           <a:xfrm>
-            <a:off x="838200" y="1700119"/>
-            <a:ext cx="10515600" cy="4667250"/>
+            <a:off x="0" y="1"/>
+            <a:ext cx="12192000" cy="1285874"/>
           </a:xfrm>
+          <a:prstGeom prst="rect">
+            <a:avLst/>
+          </a:prstGeom>
+          <a:solidFill>
+            <a:schemeClr val="tx1"/>
+          </a:solidFill>
         </p:spPr>
         <p:txBody>
-          <a:bodyPr numCol="2">
-            <a:normAutofit lnSpcReduction="10000"/>
+          <a:bodyPr vert="horz" lIns="91440" tIns="45720" rIns="91440" bIns="45720" rtlCol="0" anchor="ctr">
+            <a:normAutofit/>
           </a:bodyPr>
-          <a:lstStyle/>
-          <a:p>
-            <a:pPr marL="457200" lvl="1" indent="0">
-              <a:buNone/>
-            </a:pPr>
-            <a:r>
-              <a:rPr lang="en-US" u="sng" dirty="0"/>
-              <a:t>The Traditional Way</a:t>
-            </a:r>
-            <a:endParaRPr lang="en-US" dirty="0"/>
-          </a:p>
-          <a:p>
-            <a:pPr marL="914400" lvl="1" indent="-457200">
-              <a:buFont typeface="+mj-lt"/>
-              <a:buAutoNum type="arabicPeriod"/>
-            </a:pPr>
-            <a:r>
-              <a:rPr lang="en-US" dirty="0"/>
-              <a:t>Learn Quantum Mechanics</a:t>
-            </a:r>
-          </a:p>
-          <a:p>
-            <a:pPr lvl="2"/>
-            <a:r>
-              <a:rPr lang="en-US" sz="2200" dirty="0"/>
-              <a:t>Superposition</a:t>
-            </a:r>
-          </a:p>
-          <a:p>
-            <a:pPr lvl="2"/>
-            <a:r>
-              <a:rPr lang="en-US" sz="2200" dirty="0"/>
-              <a:t>Entanglement</a:t>
-            </a:r>
-          </a:p>
-          <a:p>
-            <a:pPr lvl="2"/>
-            <a:r>
-              <a:rPr lang="en-US" sz="2200" dirty="0"/>
-              <a:t>Schrodinger’s Equation</a:t>
-            </a:r>
-          </a:p>
-          <a:p>
-            <a:pPr lvl="2"/>
-            <a:r>
-              <a:rPr lang="en-US" sz="2200" dirty="0"/>
-              <a:t>Particles vs. Waves</a:t>
-            </a:r>
-          </a:p>
-          <a:p>
-            <a:pPr lvl="2"/>
-            <a:r>
-              <a:rPr lang="en-US" sz="2200" dirty="0"/>
-              <a:t>Repeated Measurements</a:t>
-            </a:r>
-          </a:p>
-          <a:p>
-            <a:pPr lvl="2"/>
-            <a:r>
-              <a:rPr lang="en-US" sz="2200" dirty="0"/>
-              <a:t>Etc.</a:t>
-            </a:r>
-          </a:p>
-          <a:p>
-            <a:pPr marL="914400" lvl="2" indent="0">
-              <a:buNone/>
-            </a:pPr>
-            <a:endParaRPr lang="en-US" sz="2200" dirty="0"/>
-          </a:p>
-          <a:p>
-            <a:pPr marL="914400" lvl="2" indent="0">
-              <a:buNone/>
-            </a:pPr>
-            <a:r>
-              <a:rPr lang="en-US" sz="2200" dirty="0"/>
-              <a:t>(In other words, the strange quirks of the quantum world)</a:t>
-            </a:r>
-          </a:p>
-          <a:p>
-            <a:pPr marL="914400" lvl="2" indent="0">
-              <a:buNone/>
-            </a:pPr>
-            <a:endParaRPr lang="en-US" u="sng" dirty="0"/>
-          </a:p>
-          <a:p>
-            <a:pPr marL="914400" lvl="2" indent="0">
-              <a:buNone/>
-            </a:pPr>
-            <a:endParaRPr lang="en-US" u="sng" dirty="0"/>
-          </a:p>
-          <a:p>
-            <a:pPr marL="914400" lvl="2" indent="0">
-              <a:buNone/>
-            </a:pPr>
-            <a:endParaRPr lang="en-US" u="sng" dirty="0"/>
-          </a:p>
-          <a:p>
-            <a:pPr marL="914400" lvl="2" indent="0">
-              <a:buNone/>
-            </a:pPr>
-            <a:endParaRPr lang="en-US" dirty="0"/>
-          </a:p>
-          <a:p>
-            <a:pPr marL="1371600" lvl="2" indent="-457200">
-              <a:buFont typeface="+mj-lt"/>
-              <a:buAutoNum type="arabicPeriod" startAt="2"/>
-            </a:pPr>
-            <a:r>
-              <a:rPr lang="en-US" sz="2400" dirty="0"/>
-              <a:t>Learn Quantum Computing</a:t>
-            </a:r>
-          </a:p>
-          <a:p>
-            <a:pPr lvl="3"/>
-            <a:r>
-              <a:rPr lang="en-US" sz="2200" dirty="0"/>
-              <a:t>Linear Algebra</a:t>
-            </a:r>
-          </a:p>
-          <a:p>
-            <a:pPr lvl="3"/>
-            <a:r>
-              <a:rPr lang="en-US" sz="2200" dirty="0"/>
-              <a:t>Hilbert Spaces</a:t>
-            </a:r>
-          </a:p>
-          <a:p>
-            <a:pPr lvl="3"/>
-            <a:r>
-              <a:rPr lang="en-US" sz="2200" dirty="0"/>
-              <a:t>Dirac Notation</a:t>
-            </a:r>
-          </a:p>
-          <a:p>
-            <a:pPr lvl="3"/>
-            <a:r>
-              <a:rPr lang="en-US" sz="2200" dirty="0"/>
-              <a:t>Qubit</a:t>
-            </a:r>
-          </a:p>
-          <a:p>
-            <a:pPr lvl="3"/>
-            <a:r>
-              <a:rPr lang="en-US" sz="2200" dirty="0"/>
-              <a:t>Quantum Gates/Circuits</a:t>
-            </a:r>
-          </a:p>
-          <a:p>
-            <a:pPr lvl="3"/>
-            <a:r>
-              <a:rPr lang="en-US" sz="2200" dirty="0"/>
-              <a:t>Mixed States</a:t>
-            </a:r>
-          </a:p>
-          <a:p>
-            <a:pPr lvl="3"/>
-            <a:r>
-              <a:rPr lang="en-US" sz="2200" dirty="0"/>
-              <a:t>Quantum Complexity Theory</a:t>
-            </a:r>
-          </a:p>
-          <a:p>
-            <a:pPr lvl="3"/>
-            <a:r>
-              <a:rPr lang="en-US" sz="2200" dirty="0"/>
-              <a:t>Etc.</a:t>
-            </a:r>
-          </a:p>
-          <a:p>
-            <a:pPr marL="1371600" lvl="3" indent="0">
-              <a:buNone/>
-            </a:pPr>
-            <a:endParaRPr lang="en-US" sz="2200" dirty="0"/>
-          </a:p>
-          <a:p>
-            <a:pPr marL="1371600" lvl="3" indent="0">
-              <a:buNone/>
-            </a:pPr>
-            <a:r>
-              <a:rPr lang="en-US" sz="2200" dirty="0"/>
-              <a:t>(Applying quantum weirdness to make it useful)</a:t>
-            </a:r>
-          </a:p>
-          <a:p>
-            <a:pPr marL="914400" lvl="2" indent="0">
-              <a:buNone/>
-            </a:pPr>
-            <a:endParaRPr lang="en-US" dirty="0"/>
+          <a:lstStyle>
+            <a:lvl1pPr algn="l" defTabSz="914400" rtl="0" eaLnBrk="1" latinLnBrk="0" hangingPunct="1">
+              <a:lnSpc>
+                <a:spcPct val="90000"/>
+              </a:lnSpc>
+              <a:spcBef>
+                <a:spcPct val="0"/>
+              </a:spcBef>
+              <a:buNone/>
+              <a:defRPr sz="4400" kern="1200">
+                <a:solidFill>
+                  <a:schemeClr val="tx1"/>
+                </a:solidFill>
+                <a:latin typeface="+mj-lt"/>
+                <a:ea typeface="+mj-ea"/>
+                <a:cs typeface="+mj-cs"/>
+              </a:defRPr>
+            </a:lvl1pPr>
+          </a:lstStyle>
+          <a:p>
+            <a:pPr algn="ctr"/>
+            <a:r>
+              <a:rPr lang="en-US" dirty="0">
+                <a:solidFill>
+                  <a:schemeClr val="bg1">
+                    <a:lumMod val="85000"/>
+                  </a:schemeClr>
+                </a:solidFill>
+              </a:rPr>
+              <a:t>Goals</a:t>
+            </a:r>
           </a:p>
         </p:txBody>
       </p:sp>
     </p:spTree>
     <p:extLst>
       <p:ext uri="{BB962C8B-B14F-4D97-AF65-F5344CB8AC3E}">
-        <p14:creationId xmlns:p14="http://schemas.microsoft.com/office/powerpoint/2010/main" val="1530892375"/>
+        <p14:creationId xmlns:p14="http://schemas.microsoft.com/office/powerpoint/2010/main" val="614301458"/>
       </p:ext>
     </p:extLst>
   </p:cSld>
   <p:clrMapOvr>
     <a:masterClrMapping/>
   </p:clrMapOvr>
+  <p:timing>
+    <p:tnLst>
+      <p:par>
+        <p:cTn id="1" dur="indefinite" restart="never" nodeType="tmRoot">
+          <p:childTnLst>
+            <p:seq concurrent="1" nextAc="seek">
+              <p:cTn id="2" dur="indefinite" nodeType="mainSeq">
+                <p:childTnLst>
+                  <p:par>
+                    <p:cTn id="3" fill="hold">
+                      <p:stCondLst>
+                        <p:cond delay="indefinite"/>
+                      </p:stCondLst>
+                      <p:childTnLst>
+                        <p:par>
+                          <p:cTn id="4" fill="hold">
+                            <p:stCondLst>
+                              <p:cond delay="0"/>
+                            </p:stCondLst>
+                            <p:childTnLst>
+                              <p:par>
+                                <p:cTn id="5" presetID="1" presetClass="entr" presetSubtype="0" fill="hold" nodeType="clickEffect">
+                                  <p:stCondLst>
+                                    <p:cond delay="0"/>
+                                  </p:stCondLst>
+                                  <p:childTnLst>
+                                    <p:set>
+                                      <p:cBhvr>
+                                        <p:cTn id="6" dur="1" fill="hold">
+                                          <p:stCondLst>
+                                            <p:cond delay="0"/>
+                                          </p:stCondLst>
+                                        </p:cTn>
+                                        <p:tgtEl>
+                                          <p:spTgt spid="3">
+                                            <p:txEl>
+                                              <p:pRg st="0" end="0"/>
+                                            </p:txEl>
+                                          </p:spTgt>
+                                        </p:tgtEl>
+                                        <p:attrNameLst>
+                                          <p:attrName>style.visibility</p:attrName>
+                                        </p:attrNameLst>
+                                      </p:cBhvr>
+                                      <p:to>
+                                        <p:strVal val="visible"/>
+                                      </p:to>
+                                    </p:set>
+                                  </p:childTnLst>
+                                </p:cTn>
+                              </p:par>
+                            </p:childTnLst>
+                          </p:cTn>
+                        </p:par>
+                      </p:childTnLst>
+                    </p:cTn>
+                  </p:par>
+                  <p:par>
+                    <p:cTn id="7" fill="hold">
+                      <p:stCondLst>
+                        <p:cond delay="indefinite"/>
+                      </p:stCondLst>
+                      <p:childTnLst>
+                        <p:par>
+                          <p:cTn id="8" fill="hold">
+                            <p:stCondLst>
+                              <p:cond delay="0"/>
+                            </p:stCondLst>
+                            <p:childTnLst>
+                              <p:par>
+                                <p:cTn id="9" presetID="1" presetClass="entr" presetSubtype="0" fill="hold" nodeType="clickEffect">
+                                  <p:stCondLst>
+                                    <p:cond delay="0"/>
+                                  </p:stCondLst>
+                                  <p:childTnLst>
+                                    <p:set>
+                                      <p:cBhvr>
+                                        <p:cTn id="10" dur="1" fill="hold">
+                                          <p:stCondLst>
+                                            <p:cond delay="0"/>
+                                          </p:stCondLst>
+                                        </p:cTn>
+                                        <p:tgtEl>
+                                          <p:spTgt spid="3">
+                                            <p:txEl>
+                                              <p:pRg st="2" end="2"/>
+                                            </p:txEl>
+                                          </p:spTgt>
+                                        </p:tgtEl>
+                                        <p:attrNameLst>
+                                          <p:attrName>style.visibility</p:attrName>
+                                        </p:attrNameLst>
+                                      </p:cBhvr>
+                                      <p:to>
+                                        <p:strVal val="visible"/>
+                                      </p:to>
+                                    </p:set>
+                                  </p:childTnLst>
+                                </p:cTn>
+                              </p:par>
+                            </p:childTnLst>
+                          </p:cTn>
+                        </p:par>
+                      </p:childTnLst>
+                    </p:cTn>
+                  </p:par>
+                </p:childTnLst>
+              </p:cTn>
+              <p:prevCondLst>
+                <p:cond evt="onPrev" delay="0">
+                  <p:tgtEl>
+                    <p:sldTgt/>
+                  </p:tgtEl>
+                </p:cond>
+              </p:prevCondLst>
+              <p:nextCondLst>
+                <p:cond evt="onNext" delay="0">
+                  <p:tgtEl>
+                    <p:sldTgt/>
+                  </p:tgtEl>
+                </p:cond>
+              </p:nextCondLst>
+            </p:seq>
+          </p:childTnLst>
+        </p:cTn>
+      </p:par>
+    </p:tnLst>
+  </p:timing>
 </p:sld>
 </file>
 
-<file path=ppt/slides/slide6.xml><?xml version="1.0" encoding="utf-8"?>
+<file path=ppt/slides/slide5.xml><?xml version="1.0" encoding="utf-8"?>
 <p:sld xmlns:a="http://schemas.openxmlformats.org/drawingml/2006/main" xmlns:r="http://schemas.openxmlformats.org/officeDocument/2006/relationships" xmlns:p="http://schemas.openxmlformats.org/presentationml/2006/main">
   <p:cSld>
+    <p:bg>
+      <p:bgPr>
+        <a:solidFill>
+          <a:schemeClr val="bg2">
+            <a:lumMod val="75000"/>
+          </a:schemeClr>
+        </a:solidFill>
+        <a:effectLst/>
+      </p:bgPr>
+    </p:bg>
     <p:spTree>
       <p:nvGrpSpPr>
         <p:cNvPr id="1" name=""/>
@@ -4240,38 +5305,10 @@
       </p:grpSpPr>
       <p:sp>
         <p:nvSpPr>
-          <p:cNvPr id="2" name="Title 1">
-            <a:extLst>
-              <a:ext uri="{FF2B5EF4-FFF2-40B4-BE49-F238E27FC236}">
-                <a16:creationId xmlns:a16="http://schemas.microsoft.com/office/drawing/2014/main" id="{C641EBA6-BF80-5D26-00DC-427AD629CCF2}"/>
-              </a:ext>
-            </a:extLst>
-          </p:cNvPr>
-          <p:cNvSpPr>
-            <a:spLocks noGrp="1"/>
-          </p:cNvSpPr>
-          <p:nvPr>
-            <p:ph type="title"/>
-          </p:nvPr>
-        </p:nvSpPr>
-        <p:spPr/>
-        <p:txBody>
-          <a:bodyPr/>
-          <a:lstStyle/>
-          <a:p>
-            <a:r>
-              <a:rPr lang="en-US" dirty="0"/>
-              <a:t>Step 2: Draft Lecture Outlines</a:t>
-            </a:r>
-          </a:p>
-        </p:txBody>
-      </p:sp>
-      <p:sp>
-        <p:nvSpPr>
           <p:cNvPr id="3" name="Content Placeholder 2">
             <a:extLst>
               <a:ext uri="{FF2B5EF4-FFF2-40B4-BE49-F238E27FC236}">
-                <a16:creationId xmlns:a16="http://schemas.microsoft.com/office/drawing/2014/main" id="{A0C1FE4C-4A10-A010-9E5E-21F921CEC711}"/>
+                <a16:creationId xmlns:a16="http://schemas.microsoft.com/office/drawing/2014/main" id="{B96F3094-7B2D-EF5D-C552-E2068123B7E9}"/>
               </a:ext>
             </a:extLst>
           </p:cNvPr>
@@ -4282,108 +5319,114 @@
             <p:ph idx="1"/>
           </p:nvPr>
         </p:nvSpPr>
+        <p:spPr/>
+        <p:txBody>
+          <a:bodyPr>
+            <a:normAutofit/>
+          </a:bodyPr>
+          <a:lstStyle/>
+          <a:p>
+            <a:pPr marL="514350" indent="-514350">
+              <a:buFont typeface="+mj-lt"/>
+              <a:buAutoNum type="arabicPeriod"/>
+            </a:pPr>
+            <a:r>
+              <a:rPr lang="en-US" dirty="0"/>
+              <a:t>Learn quantum computing the traditional way through self-study.</a:t>
+            </a:r>
+          </a:p>
+          <a:p>
+            <a:pPr marL="514350" indent="-514350">
+              <a:buFont typeface="+mj-lt"/>
+              <a:buAutoNum type="arabicPeriod"/>
+            </a:pPr>
+            <a:r>
+              <a:rPr lang="en-US" dirty="0"/>
+              <a:t>Draft a lecture outline, receive feedback, and repeat until a satisfactory outline is found.</a:t>
+            </a:r>
+          </a:p>
+          <a:p>
+            <a:pPr marL="514350" indent="-514350">
+              <a:buFont typeface="+mj-lt"/>
+              <a:buAutoNum type="arabicPeriod"/>
+            </a:pPr>
+            <a:r>
+              <a:rPr lang="en-US" dirty="0"/>
+              <a:t>Encode my knowledge of quantum computing into a graph that follows the structure of the lecture outline.</a:t>
+            </a:r>
+          </a:p>
+          <a:p>
+            <a:pPr marL="514350" indent="-514350">
+              <a:buFont typeface="+mj-lt"/>
+              <a:buAutoNum type="arabicPeriod"/>
+            </a:pPr>
+            <a:r>
+              <a:rPr lang="en-US" dirty="0"/>
+              <a:t>Create a list of resources and exercises for students to use to expand on their knowledge.</a:t>
+            </a:r>
+          </a:p>
+        </p:txBody>
+      </p:sp>
+      <p:sp>
+        <p:nvSpPr>
+          <p:cNvPr id="6" name="Title 1">
+            <a:extLst>
+              <a:ext uri="{FF2B5EF4-FFF2-40B4-BE49-F238E27FC236}">
+                <a16:creationId xmlns:a16="http://schemas.microsoft.com/office/drawing/2014/main" id="{E6FB5ED4-2B7B-A695-E4AE-191EC6C13C09}"/>
+              </a:ext>
+            </a:extLst>
+          </p:cNvPr>
+          <p:cNvSpPr txBox="1">
+            <a:spLocks/>
+          </p:cNvSpPr>
+          <p:nvPr/>
+        </p:nvSpPr>
         <p:spPr>
           <a:xfrm>
-            <a:off x="838200" y="1571041"/>
-            <a:ext cx="10515600" cy="4879975"/>
+            <a:off x="0" y="1"/>
+            <a:ext cx="12192000" cy="1285874"/>
           </a:xfrm>
+          <a:prstGeom prst="rect">
+            <a:avLst/>
+          </a:prstGeom>
+          <a:solidFill>
+            <a:schemeClr val="tx1"/>
+          </a:solidFill>
         </p:spPr>
         <p:txBody>
-          <a:bodyPr>
-            <a:normAutofit fontScale="92500" lnSpcReduction="20000"/>
+          <a:bodyPr vert="horz" lIns="91440" tIns="45720" rIns="91440" bIns="45720" rtlCol="0" anchor="ctr">
+            <a:normAutofit/>
           </a:bodyPr>
-          <a:lstStyle/>
-          <a:p>
-            <a:pPr marL="0" indent="0">
-              <a:buNone/>
-            </a:pPr>
-            <a:r>
-              <a:rPr lang="en-US" u="sng" dirty="0"/>
-              <a:t>Why it is important</a:t>
-            </a:r>
-            <a:r>
-              <a:rPr lang="en-US" dirty="0"/>
-              <a:t>: allows me to modify and expand upon my initial ideas, organize the content in a meaningful way, make the content more concise, etc.</a:t>
-            </a:r>
-          </a:p>
-          <a:p>
-            <a:pPr marL="0" indent="0">
-              <a:buNone/>
-            </a:pPr>
-            <a:endParaRPr lang="en-US" dirty="0"/>
-          </a:p>
-          <a:p>
-            <a:pPr marL="0" indent="0">
-              <a:buNone/>
-            </a:pPr>
-            <a:r>
-              <a:rPr lang="en-US" u="sng" dirty="0"/>
-              <a:t>Draft 1</a:t>
-            </a:r>
-            <a:r>
-              <a:rPr lang="en-US" dirty="0"/>
-              <a:t> (lecture_topics.txt): </a:t>
-            </a:r>
-          </a:p>
-          <a:p>
-            <a:pPr marL="0" indent="0">
-              <a:buNone/>
-            </a:pPr>
-            <a:r>
-              <a:rPr lang="en-US" dirty="0"/>
-              <a:t>Lengthy; unnecessary topics; unorganized; too complex of a substitute for linear algebra</a:t>
-            </a:r>
-          </a:p>
-          <a:p>
-            <a:pPr marL="0" indent="0">
-              <a:buNone/>
-            </a:pPr>
-            <a:r>
-              <a:rPr lang="en-US" u="sng" dirty="0"/>
-              <a:t>Draft 2</a:t>
-            </a:r>
-            <a:r>
-              <a:rPr lang="en-US" dirty="0"/>
-              <a:t> (lecture_outline_DRAFT.txt):</a:t>
-            </a:r>
-          </a:p>
-          <a:p>
-            <a:pPr marL="0" indent="0">
-              <a:buNone/>
-            </a:pPr>
-            <a:r>
-              <a:rPr lang="en-US" dirty="0"/>
-              <a:t>Better structured, but can be improved; still has some unnecessary topics; lacking complexity theory relevance</a:t>
-            </a:r>
-          </a:p>
-          <a:p>
-            <a:pPr marL="0" indent="0">
-              <a:buNone/>
-            </a:pPr>
-            <a:r>
-              <a:rPr lang="en-US" u="sng" dirty="0"/>
-              <a:t>Draft 3</a:t>
-            </a:r>
-            <a:r>
-              <a:rPr lang="en-US" dirty="0"/>
-              <a:t> (lecture_outline_DRAFT_2.txt):</a:t>
-            </a:r>
-          </a:p>
-          <a:p>
-            <a:pPr marL="0" indent="0">
-              <a:buNone/>
-            </a:pPr>
-            <a:r>
-              <a:rPr lang="en-US" dirty="0"/>
-              <a:t>Only (for the most part) has essential topics; has complexity theory; organized well; sections are too big (not </a:t>
-            </a:r>
-            <a:r>
-              <a:rPr lang="en-US" dirty="0" err="1"/>
-              <a:t>digestable</a:t>
-            </a:r>
-            <a:r>
-              <a:rPr lang="en-US" dirty="0"/>
-              <a:t> sizes)</a:t>
+          <a:lstStyle>
+            <a:lvl1pPr algn="l" defTabSz="914400" rtl="0" eaLnBrk="1" latinLnBrk="0" hangingPunct="1">
+              <a:lnSpc>
+                <a:spcPct val="90000"/>
+              </a:lnSpc>
+              <a:spcBef>
+                <a:spcPct val="0"/>
+              </a:spcBef>
+              <a:buNone/>
+              <a:defRPr sz="4400" kern="1200">
+                <a:solidFill>
+                  <a:schemeClr val="tx1"/>
+                </a:solidFill>
+                <a:latin typeface="+mj-lt"/>
+                <a:ea typeface="+mj-ea"/>
+                <a:cs typeface="+mj-cs"/>
+              </a:defRPr>
+            </a:lvl1pPr>
+          </a:lstStyle>
+          <a:p>
+            <a:pPr algn="ctr"/>
+            <a:r>
+              <a:rPr lang="en-US" dirty="0">
+                <a:solidFill>
+                  <a:schemeClr val="bg1">
+                    <a:lumMod val="85000"/>
+                  </a:schemeClr>
+                </a:solidFill>
+              </a:rPr>
+              <a:t>Steps to achieve the goals</a:t>
             </a:r>
           </a:p>
         </p:txBody>
@@ -4391,19 +5434,255 @@
     </p:spTree>
     <p:extLst>
       <p:ext uri="{BB962C8B-B14F-4D97-AF65-F5344CB8AC3E}">
-        <p14:creationId xmlns:p14="http://schemas.microsoft.com/office/powerpoint/2010/main" val="3444169678"/>
+        <p14:creationId xmlns:p14="http://schemas.microsoft.com/office/powerpoint/2010/main" val="765426797"/>
       </p:ext>
     </p:extLst>
   </p:cSld>
   <p:clrMapOvr>
     <a:masterClrMapping/>
   </p:clrMapOvr>
+  <p:timing>
+    <p:tnLst>
+      <p:par>
+        <p:cTn id="1" dur="indefinite" restart="never" nodeType="tmRoot">
+          <p:childTnLst>
+            <p:seq concurrent="1" nextAc="seek">
+              <p:cTn id="2" dur="indefinite" nodeType="mainSeq">
+                <p:childTnLst>
+                  <p:par>
+                    <p:cTn id="3" fill="hold">
+                      <p:stCondLst>
+                        <p:cond delay="indefinite"/>
+                      </p:stCondLst>
+                      <p:childTnLst>
+                        <p:par>
+                          <p:cTn id="4" fill="hold">
+                            <p:stCondLst>
+                              <p:cond delay="0"/>
+                            </p:stCondLst>
+                            <p:childTnLst>
+                              <p:par>
+                                <p:cTn id="5" presetID="1" presetClass="entr" presetSubtype="0" fill="hold" nodeType="clickEffect">
+                                  <p:stCondLst>
+                                    <p:cond delay="0"/>
+                                  </p:stCondLst>
+                                  <p:childTnLst>
+                                    <p:set>
+                                      <p:cBhvr>
+                                        <p:cTn id="6" dur="1" fill="hold">
+                                          <p:stCondLst>
+                                            <p:cond delay="0"/>
+                                          </p:stCondLst>
+                                        </p:cTn>
+                                        <p:tgtEl>
+                                          <p:spTgt spid="3">
+                                            <p:txEl>
+                                              <p:pRg st="0" end="0"/>
+                                            </p:txEl>
+                                          </p:spTgt>
+                                        </p:tgtEl>
+                                        <p:attrNameLst>
+                                          <p:attrName>style.visibility</p:attrName>
+                                        </p:attrNameLst>
+                                      </p:cBhvr>
+                                      <p:to>
+                                        <p:strVal val="visible"/>
+                                      </p:to>
+                                    </p:set>
+                                  </p:childTnLst>
+                                </p:cTn>
+                              </p:par>
+                            </p:childTnLst>
+                          </p:cTn>
+                        </p:par>
+                      </p:childTnLst>
+                    </p:cTn>
+                  </p:par>
+                  <p:par>
+                    <p:cTn id="7" fill="hold">
+                      <p:stCondLst>
+                        <p:cond delay="indefinite"/>
+                      </p:stCondLst>
+                      <p:childTnLst>
+                        <p:par>
+                          <p:cTn id="8" fill="hold">
+                            <p:stCondLst>
+                              <p:cond delay="0"/>
+                            </p:stCondLst>
+                            <p:childTnLst>
+                              <p:par>
+                                <p:cTn id="9" presetID="1" presetClass="entr" presetSubtype="0" fill="hold" nodeType="clickEffect">
+                                  <p:stCondLst>
+                                    <p:cond delay="0"/>
+                                  </p:stCondLst>
+                                  <p:childTnLst>
+                                    <p:set>
+                                      <p:cBhvr>
+                                        <p:cTn id="10" dur="1" fill="hold">
+                                          <p:stCondLst>
+                                            <p:cond delay="0"/>
+                                          </p:stCondLst>
+                                        </p:cTn>
+                                        <p:tgtEl>
+                                          <p:spTgt spid="3">
+                                            <p:txEl>
+                                              <p:pRg st="1" end="1"/>
+                                            </p:txEl>
+                                          </p:spTgt>
+                                        </p:tgtEl>
+                                        <p:attrNameLst>
+                                          <p:attrName>style.visibility</p:attrName>
+                                        </p:attrNameLst>
+                                      </p:cBhvr>
+                                      <p:to>
+                                        <p:strVal val="visible"/>
+                                      </p:to>
+                                    </p:set>
+                                  </p:childTnLst>
+                                </p:cTn>
+                              </p:par>
+                            </p:childTnLst>
+                          </p:cTn>
+                        </p:par>
+                      </p:childTnLst>
+                    </p:cTn>
+                  </p:par>
+                  <p:par>
+                    <p:cTn id="11" fill="hold">
+                      <p:stCondLst>
+                        <p:cond delay="indefinite"/>
+                      </p:stCondLst>
+                      <p:childTnLst>
+                        <p:par>
+                          <p:cTn id="12" fill="hold">
+                            <p:stCondLst>
+                              <p:cond delay="0"/>
+                            </p:stCondLst>
+                            <p:childTnLst>
+                              <p:par>
+                                <p:cTn id="13" presetID="1" presetClass="entr" presetSubtype="0" fill="hold" nodeType="clickEffect">
+                                  <p:stCondLst>
+                                    <p:cond delay="0"/>
+                                  </p:stCondLst>
+                                  <p:childTnLst>
+                                    <p:set>
+                                      <p:cBhvr>
+                                        <p:cTn id="14" dur="1" fill="hold">
+                                          <p:stCondLst>
+                                            <p:cond delay="0"/>
+                                          </p:stCondLst>
+                                        </p:cTn>
+                                        <p:tgtEl>
+                                          <p:spTgt spid="3">
+                                            <p:txEl>
+                                              <p:pRg st="2" end="2"/>
+                                            </p:txEl>
+                                          </p:spTgt>
+                                        </p:tgtEl>
+                                        <p:attrNameLst>
+                                          <p:attrName>style.visibility</p:attrName>
+                                        </p:attrNameLst>
+                                      </p:cBhvr>
+                                      <p:to>
+                                        <p:strVal val="visible"/>
+                                      </p:to>
+                                    </p:set>
+                                  </p:childTnLst>
+                                </p:cTn>
+                              </p:par>
+                            </p:childTnLst>
+                          </p:cTn>
+                        </p:par>
+                      </p:childTnLst>
+                    </p:cTn>
+                  </p:par>
+                  <p:par>
+                    <p:cTn id="15" fill="hold">
+                      <p:stCondLst>
+                        <p:cond delay="indefinite"/>
+                      </p:stCondLst>
+                      <p:childTnLst>
+                        <p:par>
+                          <p:cTn id="16" fill="hold">
+                            <p:stCondLst>
+                              <p:cond delay="0"/>
+                            </p:stCondLst>
+                            <p:childTnLst>
+                              <p:par>
+                                <p:cTn id="17" presetID="1" presetClass="entr" presetSubtype="0" fill="hold" nodeType="clickEffect">
+                                  <p:stCondLst>
+                                    <p:cond delay="0"/>
+                                  </p:stCondLst>
+                                  <p:childTnLst>
+                                    <p:set>
+                                      <p:cBhvr>
+                                        <p:cTn id="18" dur="1" fill="hold">
+                                          <p:stCondLst>
+                                            <p:cond delay="0"/>
+                                          </p:stCondLst>
+                                        </p:cTn>
+                                        <p:tgtEl>
+                                          <p:spTgt spid="3">
+                                            <p:txEl>
+                                              <p:pRg st="3" end="3"/>
+                                            </p:txEl>
+                                          </p:spTgt>
+                                        </p:tgtEl>
+                                        <p:attrNameLst>
+                                          <p:attrName>style.visibility</p:attrName>
+                                        </p:attrNameLst>
+                                      </p:cBhvr>
+                                      <p:to>
+                                        <p:strVal val="visible"/>
+                                      </p:to>
+                                    </p:set>
+                                  </p:childTnLst>
+                                </p:cTn>
+                              </p:par>
+                            </p:childTnLst>
+                          </p:cTn>
+                        </p:par>
+                      </p:childTnLst>
+                    </p:cTn>
+                  </p:par>
+                </p:childTnLst>
+              </p:cTn>
+              <p:prevCondLst>
+                <p:cond evt="onPrev" delay="0">
+                  <p:tgtEl>
+                    <p:sldTgt/>
+                  </p:tgtEl>
+                </p:cond>
+              </p:prevCondLst>
+              <p:nextCondLst>
+                <p:cond evt="onNext" delay="0">
+                  <p:tgtEl>
+                    <p:sldTgt/>
+                  </p:tgtEl>
+                </p:cond>
+              </p:nextCondLst>
+            </p:seq>
+          </p:childTnLst>
+        </p:cTn>
+      </p:par>
+    </p:tnLst>
+  </p:timing>
 </p:sld>
 </file>
 
-<file path=ppt/slides/slide7.xml><?xml version="1.0" encoding="utf-8"?>
+<file path=ppt/slides/slide6.xml><?xml version="1.0" encoding="utf-8"?>
 <p:sld xmlns:a="http://schemas.openxmlformats.org/drawingml/2006/main" xmlns:r="http://schemas.openxmlformats.org/officeDocument/2006/relationships" xmlns:p="http://schemas.openxmlformats.org/presentationml/2006/main">
   <p:cSld>
+    <p:bg>
+      <p:bgPr>
+        <a:solidFill>
+          <a:schemeClr val="bg2">
+            <a:lumMod val="75000"/>
+          </a:schemeClr>
+        </a:solidFill>
+        <a:effectLst/>
+      </p:bgPr>
+    </p:bg>
     <p:spTree>
       <p:nvGrpSpPr>
         <p:cNvPr id="1" name=""/>
@@ -4420,87 +5699,374 @@
       </p:grpSpPr>
       <p:sp>
         <p:nvSpPr>
-          <p:cNvPr id="2" name="Title 1">
-            <a:extLst>
-              <a:ext uri="{FF2B5EF4-FFF2-40B4-BE49-F238E27FC236}">
-                <a16:creationId xmlns:a16="http://schemas.microsoft.com/office/drawing/2014/main" id="{CD354227-7CCC-6BA6-8193-771C1FC806A1}"/>
-              </a:ext>
-            </a:extLst>
-          </p:cNvPr>
-          <p:cNvSpPr>
-            <a:spLocks noGrp="1"/>
-          </p:cNvSpPr>
-          <p:nvPr>
-            <p:ph type="title"/>
-          </p:nvPr>
-        </p:nvSpPr>
-        <p:spPr/>
-        <p:txBody>
-          <a:bodyPr/>
+          <p:cNvPr id="6" name="Title 1">
+            <a:extLst>
+              <a:ext uri="{FF2B5EF4-FFF2-40B4-BE49-F238E27FC236}">
+                <a16:creationId xmlns:a16="http://schemas.microsoft.com/office/drawing/2014/main" id="{E629F44E-A5CC-9D12-1A2B-13350DFDB78D}"/>
+              </a:ext>
+            </a:extLst>
+          </p:cNvPr>
+          <p:cNvSpPr txBox="1">
+            <a:spLocks/>
+          </p:cNvSpPr>
+          <p:nvPr/>
+        </p:nvSpPr>
+        <p:spPr>
+          <a:xfrm>
+            <a:off x="0" y="1"/>
+            <a:ext cx="12192000" cy="1285874"/>
+          </a:xfrm>
+          <a:prstGeom prst="rect">
+            <a:avLst/>
+          </a:prstGeom>
+          <a:solidFill>
+            <a:schemeClr val="tx1"/>
+          </a:solidFill>
+        </p:spPr>
+        <p:txBody>
+          <a:bodyPr vert="horz" lIns="91440" tIns="45720" rIns="91440" bIns="45720" rtlCol="0" anchor="ctr">
+            <a:normAutofit/>
+          </a:bodyPr>
+          <a:lstStyle>
+            <a:lvl1pPr algn="l" defTabSz="914400" rtl="0" eaLnBrk="1" latinLnBrk="0" hangingPunct="1">
+              <a:lnSpc>
+                <a:spcPct val="90000"/>
+              </a:lnSpc>
+              <a:spcBef>
+                <a:spcPct val="0"/>
+              </a:spcBef>
+              <a:buNone/>
+              <a:defRPr sz="4400" kern="1200">
+                <a:solidFill>
+                  <a:schemeClr val="tx1"/>
+                </a:solidFill>
+                <a:latin typeface="+mj-lt"/>
+                <a:ea typeface="+mj-ea"/>
+                <a:cs typeface="+mj-cs"/>
+              </a:defRPr>
+            </a:lvl1pPr>
+          </a:lstStyle>
+          <a:p>
+            <a:pPr algn="ctr"/>
+            <a:r>
+              <a:rPr lang="en-US" u="sng" dirty="0">
+                <a:solidFill>
+                  <a:schemeClr val="bg1">
+                    <a:lumMod val="85000"/>
+                  </a:schemeClr>
+                </a:solidFill>
+              </a:rPr>
+              <a:t>Step 1</a:t>
+            </a:r>
+            <a:r>
+              <a:rPr lang="en-US" dirty="0">
+                <a:solidFill>
+                  <a:schemeClr val="bg1">
+                    <a:lumMod val="85000"/>
+                  </a:schemeClr>
+                </a:solidFill>
+              </a:rPr>
+              <a:t>: Learn Quantum Computing</a:t>
+            </a:r>
+            <a:endParaRPr lang="en-US" u="sng" dirty="0">
+              <a:solidFill>
+                <a:schemeClr val="bg1">
+                  <a:lumMod val="85000"/>
+                </a:schemeClr>
+              </a:solidFill>
+            </a:endParaRPr>
+          </a:p>
+        </p:txBody>
+      </p:sp>
+      <p:sp>
+        <p:nvSpPr>
+          <p:cNvPr id="9" name="TextBox 8">
+            <a:extLst>
+              <a:ext uri="{FF2B5EF4-FFF2-40B4-BE49-F238E27FC236}">
+                <a16:creationId xmlns:a16="http://schemas.microsoft.com/office/drawing/2014/main" id="{A0FAF03B-E620-2760-BDCB-9160D05B8E1C}"/>
+              </a:ext>
+            </a:extLst>
+          </p:cNvPr>
+          <p:cNvSpPr txBox="1"/>
+          <p:nvPr/>
+        </p:nvSpPr>
+        <p:spPr>
+          <a:xfrm>
+            <a:off x="134474" y="2496110"/>
+            <a:ext cx="4814047" cy="3785652"/>
+          </a:xfrm>
+          <a:prstGeom prst="rect">
+            <a:avLst/>
+          </a:prstGeom>
+          <a:noFill/>
+        </p:spPr>
+        <p:txBody>
+          <a:bodyPr wrap="square" rtlCol="0">
+            <a:spAutoFit/>
+          </a:bodyPr>
           <a:lstStyle/>
           <a:p>
-            <a:r>
-              <a:rPr lang="en-US" dirty="0"/>
-              <a:t>Step 3: Encode Knowledge Into Graph</a:t>
-            </a:r>
-          </a:p>
-        </p:txBody>
-      </p:sp>
-      <p:sp>
-        <p:nvSpPr>
-          <p:cNvPr id="3" name="Content Placeholder 2">
-            <a:extLst>
-              <a:ext uri="{FF2B5EF4-FFF2-40B4-BE49-F238E27FC236}">
-                <a16:creationId xmlns:a16="http://schemas.microsoft.com/office/drawing/2014/main" id="{A3113824-5BF9-9CEC-16DA-0C6C6BF0B3C5}"/>
-              </a:ext>
-            </a:extLst>
-          </p:cNvPr>
-          <p:cNvSpPr>
-            <a:spLocks noGrp="1"/>
-          </p:cNvSpPr>
-          <p:nvPr>
-            <p:ph idx="1"/>
-          </p:nvPr>
-        </p:nvSpPr>
-        <p:spPr/>
-        <p:txBody>
-          <a:bodyPr/>
+            <a:pPr marL="914400" lvl="1" indent="-457200">
+              <a:buFont typeface="+mj-lt"/>
+              <a:buAutoNum type="arabicPeriod"/>
+            </a:pPr>
+            <a:r>
+              <a:rPr lang="en-US" sz="2400" dirty="0"/>
+              <a:t>Learn Quantum Mechanics</a:t>
+            </a:r>
+          </a:p>
+          <a:p>
+            <a:pPr marL="1257300" lvl="2" indent="-342900">
+              <a:buFont typeface="Wingdings" panose="05000000000000000000" pitchFamily="2" charset="2"/>
+              <a:buChar char="q"/>
+            </a:pPr>
+            <a:r>
+              <a:rPr lang="en-US" sz="2200" dirty="0"/>
+              <a:t>Superposition</a:t>
+            </a:r>
+          </a:p>
+          <a:p>
+            <a:pPr marL="1257300" lvl="2" indent="-342900">
+              <a:buFont typeface="Wingdings" panose="05000000000000000000" pitchFamily="2" charset="2"/>
+              <a:buChar char="q"/>
+            </a:pPr>
+            <a:r>
+              <a:rPr lang="en-US" sz="2200" dirty="0"/>
+              <a:t>Entanglement</a:t>
+            </a:r>
+          </a:p>
+          <a:p>
+            <a:pPr marL="1257300" lvl="2" indent="-342900">
+              <a:buFont typeface="Wingdings" panose="05000000000000000000" pitchFamily="2" charset="2"/>
+              <a:buChar char="q"/>
+            </a:pPr>
+            <a:r>
+              <a:rPr lang="en-US" sz="2200" dirty="0"/>
+              <a:t>Schrodinger’s Equation</a:t>
+            </a:r>
+          </a:p>
+          <a:p>
+            <a:pPr marL="1257300" lvl="2" indent="-342900">
+              <a:buFont typeface="Wingdings" panose="05000000000000000000" pitchFamily="2" charset="2"/>
+              <a:buChar char="q"/>
+            </a:pPr>
+            <a:r>
+              <a:rPr lang="en-US" sz="2200" dirty="0"/>
+              <a:t>Particles vs. Waves</a:t>
+            </a:r>
+          </a:p>
+          <a:p>
+            <a:pPr marL="1257300" lvl="2" indent="-342900">
+              <a:buFont typeface="Wingdings" panose="05000000000000000000" pitchFamily="2" charset="2"/>
+              <a:buChar char="q"/>
+            </a:pPr>
+            <a:r>
+              <a:rPr lang="en-US" sz="2200" dirty="0"/>
+              <a:t>Repeated Measurements</a:t>
+            </a:r>
+          </a:p>
+          <a:p>
+            <a:pPr marL="1257300" lvl="2" indent="-342900">
+              <a:buFont typeface="Wingdings" panose="05000000000000000000" pitchFamily="2" charset="2"/>
+              <a:buChar char="q"/>
+            </a:pPr>
+            <a:r>
+              <a:rPr lang="en-US" sz="2200" dirty="0"/>
+              <a:t>Etc.</a:t>
+            </a:r>
+          </a:p>
+          <a:p>
+            <a:pPr marL="914400" lvl="2" indent="0">
+              <a:buNone/>
+            </a:pPr>
+            <a:endParaRPr lang="en-US" sz="2200" dirty="0"/>
+          </a:p>
+          <a:p>
+            <a:pPr marL="914400" lvl="2" indent="0">
+              <a:buNone/>
+            </a:pPr>
+            <a:r>
+              <a:rPr lang="en-US" sz="2200" dirty="0"/>
+              <a:t>(In other words, the strange quirks of the quantum world)</a:t>
+            </a:r>
+          </a:p>
+          <a:p>
+            <a:endParaRPr lang="en-US" dirty="0"/>
+          </a:p>
+        </p:txBody>
+      </p:sp>
+      <p:sp>
+        <p:nvSpPr>
+          <p:cNvPr id="10" name="TextBox 9">
+            <a:extLst>
+              <a:ext uri="{FF2B5EF4-FFF2-40B4-BE49-F238E27FC236}">
+                <a16:creationId xmlns:a16="http://schemas.microsoft.com/office/drawing/2014/main" id="{52FDB4F7-72AF-A57C-E61A-F0B8CB78A8AB}"/>
+              </a:ext>
+            </a:extLst>
+          </p:cNvPr>
+          <p:cNvSpPr txBox="1"/>
+          <p:nvPr/>
+        </p:nvSpPr>
+        <p:spPr>
+          <a:xfrm>
+            <a:off x="5629836" y="2500032"/>
+            <a:ext cx="5934635" cy="4893647"/>
+          </a:xfrm>
+          <a:prstGeom prst="rect">
+            <a:avLst/>
+          </a:prstGeom>
+          <a:noFill/>
+        </p:spPr>
+        <p:txBody>
+          <a:bodyPr wrap="square" rtlCol="0">
+            <a:spAutoFit/>
+          </a:bodyPr>
           <a:lstStyle/>
           <a:p>
-            <a:pPr marL="0" indent="0">
-              <a:buNone/>
+            <a:pPr marL="1371600" lvl="2" indent="-457200">
+              <a:buFont typeface="+mj-lt"/>
+              <a:buAutoNum type="arabicPeriod" startAt="2"/>
             </a:pPr>
             <a:r>
-              <a:rPr lang="en-US" u="sng" dirty="0"/>
-              <a:t>Why?</a:t>
-            </a:r>
-            <a:r>
-              <a:rPr lang="en-US" dirty="0"/>
-              <a:t> So that that others can use and build upon my current design. It also helps future learners of quantum computing by providing a roadmap of topics to learn in what order.</a:t>
-            </a:r>
-          </a:p>
-          <a:p>
-            <a:pPr marL="0" indent="0">
+              <a:rPr lang="en-US" sz="2400" dirty="0"/>
+              <a:t>Learn Quantum Computing</a:t>
+            </a:r>
+          </a:p>
+          <a:p>
+            <a:pPr marL="1714500" lvl="3" indent="-342900">
+              <a:buFont typeface="Wingdings" panose="05000000000000000000" pitchFamily="2" charset="2"/>
+              <a:buChar char="q"/>
+            </a:pPr>
+            <a:r>
+              <a:rPr lang="en-US" sz="2200" dirty="0"/>
+              <a:t>Linear Algebra</a:t>
+            </a:r>
+          </a:p>
+          <a:p>
+            <a:pPr marL="1714500" lvl="3" indent="-342900">
+              <a:buFont typeface="Wingdings" panose="05000000000000000000" pitchFamily="2" charset="2"/>
+              <a:buChar char="q"/>
+            </a:pPr>
+            <a:r>
+              <a:rPr lang="en-US" sz="2200" dirty="0"/>
+              <a:t>Dirac Notation</a:t>
+            </a:r>
+          </a:p>
+          <a:p>
+            <a:pPr marL="1714500" lvl="3" indent="-342900">
+              <a:buFont typeface="Wingdings" panose="05000000000000000000" pitchFamily="2" charset="2"/>
+              <a:buChar char="q"/>
+            </a:pPr>
+            <a:r>
+              <a:rPr lang="en-US" sz="2200" dirty="0"/>
+              <a:t>Qubits &amp; Mixed States</a:t>
+            </a:r>
+          </a:p>
+          <a:p>
+            <a:pPr marL="1714500" lvl="3" indent="-342900">
+              <a:buFont typeface="Wingdings" panose="05000000000000000000" pitchFamily="2" charset="2"/>
+              <a:buChar char="q"/>
+            </a:pPr>
+            <a:r>
+              <a:rPr lang="en-US" sz="2200" dirty="0"/>
+              <a:t>Quantum Gates/Circuits</a:t>
+            </a:r>
+          </a:p>
+          <a:p>
+            <a:pPr marL="1714500" lvl="3" indent="-342900">
+              <a:buFont typeface="Wingdings" panose="05000000000000000000" pitchFamily="2" charset="2"/>
+              <a:buChar char="q"/>
+            </a:pPr>
+            <a:r>
+              <a:rPr lang="en-US" sz="2200" dirty="0"/>
+              <a:t>Quantum Complexity Theory</a:t>
+            </a:r>
+          </a:p>
+          <a:p>
+            <a:pPr marL="1714500" lvl="3" indent="-342900">
+              <a:buFont typeface="Wingdings" panose="05000000000000000000" pitchFamily="2" charset="2"/>
+              <a:buChar char="q"/>
+            </a:pPr>
+            <a:r>
+              <a:rPr lang="en-US" sz="2200" dirty="0"/>
+              <a:t>Etc.</a:t>
+            </a:r>
+          </a:p>
+          <a:p>
+            <a:pPr marL="1371600" lvl="3" indent="0">
+              <a:buNone/>
+            </a:pPr>
+            <a:endParaRPr lang="en-US" sz="2200" dirty="0"/>
+          </a:p>
+          <a:p>
+            <a:pPr marL="1371600" lvl="3" indent="0">
+              <a:buNone/>
+            </a:pPr>
+            <a:r>
+              <a:rPr lang="en-US" sz="2200" dirty="0"/>
+              <a:t>(Applying quantum weirdness to make it useful)</a:t>
+            </a:r>
+          </a:p>
+          <a:p>
+            <a:pPr marL="914400" lvl="2" indent="0">
               <a:buNone/>
             </a:pPr>
             <a:endParaRPr lang="en-US" u="sng" dirty="0"/>
           </a:p>
           <a:p>
-            <a:pPr marL="0" indent="0">
+            <a:pPr marL="914400" lvl="2" indent="0">
               <a:buNone/>
             </a:pPr>
-            <a:r>
-              <a:rPr lang="en-US" dirty="0"/>
-              <a:t>{insert picture of dependency tree graph here}</a:t>
-            </a:r>
-          </a:p>
-          <a:p>
-            <a:pPr marL="0" indent="0">
+            <a:endParaRPr lang="en-US" u="sng" dirty="0"/>
+          </a:p>
+          <a:p>
+            <a:pPr marL="914400" lvl="2" indent="0">
               <a:buNone/>
             </a:pPr>
-            <a:r>
-              <a:rPr lang="en-US" dirty="0"/>
-              <a:t>{describe the graph}</a:t>
+            <a:endParaRPr lang="en-US" u="sng" dirty="0"/>
+          </a:p>
+          <a:p>
+            <a:pPr marL="914400" lvl="2" indent="0">
+              <a:buNone/>
+            </a:pPr>
+            <a:endParaRPr lang="en-US" dirty="0"/>
+          </a:p>
+          <a:p>
+            <a:endParaRPr lang="en-US" dirty="0"/>
+          </a:p>
+        </p:txBody>
+      </p:sp>
+      <p:sp>
+        <p:nvSpPr>
+          <p:cNvPr id="11" name="TextBox 10">
+            <a:extLst>
+              <a:ext uri="{FF2B5EF4-FFF2-40B4-BE49-F238E27FC236}">
+                <a16:creationId xmlns:a16="http://schemas.microsoft.com/office/drawing/2014/main" id="{8819EDF5-1C49-283D-11BD-6E678F1A1FD9}"/>
+              </a:ext>
+            </a:extLst>
+          </p:cNvPr>
+          <p:cNvSpPr txBox="1"/>
+          <p:nvPr/>
+        </p:nvSpPr>
+        <p:spPr>
+          <a:xfrm>
+            <a:off x="4083424" y="1627422"/>
+            <a:ext cx="3092823" cy="523220"/>
+          </a:xfrm>
+          <a:prstGeom prst="rect">
+            <a:avLst/>
+          </a:prstGeom>
+          <a:noFill/>
+        </p:spPr>
+        <p:txBody>
+          <a:bodyPr wrap="square" rtlCol="0">
+            <a:spAutoFit/>
+          </a:bodyPr>
+          <a:lstStyle/>
+          <a:p>
+            <a:r>
+              <a:rPr lang="en-US" sz="2800" u="sng" dirty="0"/>
+              <a:t>The Traditional Way</a:t>
             </a:r>
           </a:p>
         </p:txBody>
@@ -4508,19 +6074,627 @@
     </p:spTree>
     <p:extLst>
       <p:ext uri="{BB962C8B-B14F-4D97-AF65-F5344CB8AC3E}">
-        <p14:creationId xmlns:p14="http://schemas.microsoft.com/office/powerpoint/2010/main" val="3784721756"/>
+        <p14:creationId xmlns:p14="http://schemas.microsoft.com/office/powerpoint/2010/main" val="1530892375"/>
       </p:ext>
     </p:extLst>
   </p:cSld>
   <p:clrMapOvr>
     <a:masterClrMapping/>
   </p:clrMapOvr>
+  <p:timing>
+    <p:tnLst>
+      <p:par>
+        <p:cTn id="1" dur="indefinite" restart="never" nodeType="tmRoot">
+          <p:childTnLst>
+            <p:seq concurrent="1" nextAc="seek">
+              <p:cTn id="2" dur="indefinite" nodeType="mainSeq">
+                <p:childTnLst>
+                  <p:par>
+                    <p:cTn id="3" fill="hold">
+                      <p:stCondLst>
+                        <p:cond delay="indefinite"/>
+                      </p:stCondLst>
+                      <p:childTnLst>
+                        <p:par>
+                          <p:cTn id="4" fill="hold">
+                            <p:stCondLst>
+                              <p:cond delay="0"/>
+                            </p:stCondLst>
+                            <p:childTnLst>
+                              <p:par>
+                                <p:cTn id="5" presetID="1" presetClass="entr" presetSubtype="0" fill="hold" nodeType="clickEffect">
+                                  <p:stCondLst>
+                                    <p:cond delay="0"/>
+                                  </p:stCondLst>
+                                  <p:childTnLst>
+                                    <p:set>
+                                      <p:cBhvr>
+                                        <p:cTn id="6" dur="1" fill="hold">
+                                          <p:stCondLst>
+                                            <p:cond delay="0"/>
+                                          </p:stCondLst>
+                                        </p:cTn>
+                                        <p:tgtEl>
+                                          <p:spTgt spid="9">
+                                            <p:txEl>
+                                              <p:pRg st="0" end="0"/>
+                                            </p:txEl>
+                                          </p:spTgt>
+                                        </p:tgtEl>
+                                        <p:attrNameLst>
+                                          <p:attrName>style.visibility</p:attrName>
+                                        </p:attrNameLst>
+                                      </p:cBhvr>
+                                      <p:to>
+                                        <p:strVal val="visible"/>
+                                      </p:to>
+                                    </p:set>
+                                  </p:childTnLst>
+                                </p:cTn>
+                              </p:par>
+                              <p:par>
+                                <p:cTn id="7" presetID="1" presetClass="entr" presetSubtype="0" fill="hold" nodeType="withEffect">
+                                  <p:stCondLst>
+                                    <p:cond delay="0"/>
+                                  </p:stCondLst>
+                                  <p:childTnLst>
+                                    <p:set>
+                                      <p:cBhvr>
+                                        <p:cTn id="8" dur="1" fill="hold">
+                                          <p:stCondLst>
+                                            <p:cond delay="0"/>
+                                          </p:stCondLst>
+                                        </p:cTn>
+                                        <p:tgtEl>
+                                          <p:spTgt spid="9">
+                                            <p:txEl>
+                                              <p:pRg st="1" end="1"/>
+                                            </p:txEl>
+                                          </p:spTgt>
+                                        </p:tgtEl>
+                                        <p:attrNameLst>
+                                          <p:attrName>style.visibility</p:attrName>
+                                        </p:attrNameLst>
+                                      </p:cBhvr>
+                                      <p:to>
+                                        <p:strVal val="visible"/>
+                                      </p:to>
+                                    </p:set>
+                                  </p:childTnLst>
+                                </p:cTn>
+                              </p:par>
+                              <p:par>
+                                <p:cTn id="9" presetID="1" presetClass="entr" presetSubtype="0" fill="hold" nodeType="withEffect">
+                                  <p:stCondLst>
+                                    <p:cond delay="0"/>
+                                  </p:stCondLst>
+                                  <p:childTnLst>
+                                    <p:set>
+                                      <p:cBhvr>
+                                        <p:cTn id="10" dur="1" fill="hold">
+                                          <p:stCondLst>
+                                            <p:cond delay="0"/>
+                                          </p:stCondLst>
+                                        </p:cTn>
+                                        <p:tgtEl>
+                                          <p:spTgt spid="9">
+                                            <p:txEl>
+                                              <p:pRg st="2" end="2"/>
+                                            </p:txEl>
+                                          </p:spTgt>
+                                        </p:tgtEl>
+                                        <p:attrNameLst>
+                                          <p:attrName>style.visibility</p:attrName>
+                                        </p:attrNameLst>
+                                      </p:cBhvr>
+                                      <p:to>
+                                        <p:strVal val="visible"/>
+                                      </p:to>
+                                    </p:set>
+                                  </p:childTnLst>
+                                </p:cTn>
+                              </p:par>
+                              <p:par>
+                                <p:cTn id="11" presetID="1" presetClass="entr" presetSubtype="0" fill="hold" nodeType="withEffect">
+                                  <p:stCondLst>
+                                    <p:cond delay="0"/>
+                                  </p:stCondLst>
+                                  <p:childTnLst>
+                                    <p:set>
+                                      <p:cBhvr>
+                                        <p:cTn id="12" dur="1" fill="hold">
+                                          <p:stCondLst>
+                                            <p:cond delay="0"/>
+                                          </p:stCondLst>
+                                        </p:cTn>
+                                        <p:tgtEl>
+                                          <p:spTgt spid="9">
+                                            <p:txEl>
+                                              <p:pRg st="3" end="3"/>
+                                            </p:txEl>
+                                          </p:spTgt>
+                                        </p:tgtEl>
+                                        <p:attrNameLst>
+                                          <p:attrName>style.visibility</p:attrName>
+                                        </p:attrNameLst>
+                                      </p:cBhvr>
+                                      <p:to>
+                                        <p:strVal val="visible"/>
+                                      </p:to>
+                                    </p:set>
+                                  </p:childTnLst>
+                                </p:cTn>
+                              </p:par>
+                              <p:par>
+                                <p:cTn id="13" presetID="1" presetClass="entr" presetSubtype="0" fill="hold" nodeType="withEffect">
+                                  <p:stCondLst>
+                                    <p:cond delay="0"/>
+                                  </p:stCondLst>
+                                  <p:childTnLst>
+                                    <p:set>
+                                      <p:cBhvr>
+                                        <p:cTn id="14" dur="1" fill="hold">
+                                          <p:stCondLst>
+                                            <p:cond delay="0"/>
+                                          </p:stCondLst>
+                                        </p:cTn>
+                                        <p:tgtEl>
+                                          <p:spTgt spid="9">
+                                            <p:txEl>
+                                              <p:pRg st="4" end="4"/>
+                                            </p:txEl>
+                                          </p:spTgt>
+                                        </p:tgtEl>
+                                        <p:attrNameLst>
+                                          <p:attrName>style.visibility</p:attrName>
+                                        </p:attrNameLst>
+                                      </p:cBhvr>
+                                      <p:to>
+                                        <p:strVal val="visible"/>
+                                      </p:to>
+                                    </p:set>
+                                  </p:childTnLst>
+                                </p:cTn>
+                              </p:par>
+                              <p:par>
+                                <p:cTn id="15" presetID="1" presetClass="entr" presetSubtype="0" fill="hold" nodeType="withEffect">
+                                  <p:stCondLst>
+                                    <p:cond delay="0"/>
+                                  </p:stCondLst>
+                                  <p:childTnLst>
+                                    <p:set>
+                                      <p:cBhvr>
+                                        <p:cTn id="16" dur="1" fill="hold">
+                                          <p:stCondLst>
+                                            <p:cond delay="0"/>
+                                          </p:stCondLst>
+                                        </p:cTn>
+                                        <p:tgtEl>
+                                          <p:spTgt spid="9">
+                                            <p:txEl>
+                                              <p:pRg st="5" end="5"/>
+                                            </p:txEl>
+                                          </p:spTgt>
+                                        </p:tgtEl>
+                                        <p:attrNameLst>
+                                          <p:attrName>style.visibility</p:attrName>
+                                        </p:attrNameLst>
+                                      </p:cBhvr>
+                                      <p:to>
+                                        <p:strVal val="visible"/>
+                                      </p:to>
+                                    </p:set>
+                                  </p:childTnLst>
+                                </p:cTn>
+                              </p:par>
+                              <p:par>
+                                <p:cTn id="17" presetID="1" presetClass="entr" presetSubtype="0" fill="hold" nodeType="withEffect">
+                                  <p:stCondLst>
+                                    <p:cond delay="0"/>
+                                  </p:stCondLst>
+                                  <p:childTnLst>
+                                    <p:set>
+                                      <p:cBhvr>
+                                        <p:cTn id="18" dur="1" fill="hold">
+                                          <p:stCondLst>
+                                            <p:cond delay="0"/>
+                                          </p:stCondLst>
+                                        </p:cTn>
+                                        <p:tgtEl>
+                                          <p:spTgt spid="9">
+                                            <p:txEl>
+                                              <p:pRg st="6" end="6"/>
+                                            </p:txEl>
+                                          </p:spTgt>
+                                        </p:tgtEl>
+                                        <p:attrNameLst>
+                                          <p:attrName>style.visibility</p:attrName>
+                                        </p:attrNameLst>
+                                      </p:cBhvr>
+                                      <p:to>
+                                        <p:strVal val="visible"/>
+                                      </p:to>
+                                    </p:set>
+                                  </p:childTnLst>
+                                </p:cTn>
+                              </p:par>
+                            </p:childTnLst>
+                          </p:cTn>
+                        </p:par>
+                      </p:childTnLst>
+                    </p:cTn>
+                  </p:par>
+                  <p:par>
+                    <p:cTn id="19" fill="hold">
+                      <p:stCondLst>
+                        <p:cond delay="indefinite"/>
+                      </p:stCondLst>
+                      <p:childTnLst>
+                        <p:par>
+                          <p:cTn id="20" fill="hold">
+                            <p:stCondLst>
+                              <p:cond delay="0"/>
+                            </p:stCondLst>
+                            <p:childTnLst>
+                              <p:par>
+                                <p:cTn id="21" presetID="1" presetClass="entr" presetSubtype="0" fill="hold" nodeType="clickEffect">
+                                  <p:stCondLst>
+                                    <p:cond delay="0"/>
+                                  </p:stCondLst>
+                                  <p:childTnLst>
+                                    <p:set>
+                                      <p:cBhvr>
+                                        <p:cTn id="22" dur="1" fill="hold">
+                                          <p:stCondLst>
+                                            <p:cond delay="0"/>
+                                          </p:stCondLst>
+                                        </p:cTn>
+                                        <p:tgtEl>
+                                          <p:spTgt spid="9">
+                                            <p:txEl>
+                                              <p:pRg st="8" end="8"/>
+                                            </p:txEl>
+                                          </p:spTgt>
+                                        </p:tgtEl>
+                                        <p:attrNameLst>
+                                          <p:attrName>style.visibility</p:attrName>
+                                        </p:attrNameLst>
+                                      </p:cBhvr>
+                                      <p:to>
+                                        <p:strVal val="visible"/>
+                                      </p:to>
+                                    </p:set>
+                                  </p:childTnLst>
+                                </p:cTn>
+                              </p:par>
+                            </p:childTnLst>
+                          </p:cTn>
+                        </p:par>
+                      </p:childTnLst>
+                    </p:cTn>
+                  </p:par>
+                  <p:par>
+                    <p:cTn id="23" fill="hold">
+                      <p:stCondLst>
+                        <p:cond delay="indefinite"/>
+                      </p:stCondLst>
+                      <p:childTnLst>
+                        <p:par>
+                          <p:cTn id="24" fill="hold">
+                            <p:stCondLst>
+                              <p:cond delay="0"/>
+                            </p:stCondLst>
+                            <p:childTnLst>
+                              <p:par>
+                                <p:cTn id="25" presetID="1" presetClass="entr" presetSubtype="0" fill="hold" nodeType="clickEffect">
+                                  <p:stCondLst>
+                                    <p:cond delay="0"/>
+                                  </p:stCondLst>
+                                  <p:childTnLst>
+                                    <p:set>
+                                      <p:cBhvr>
+                                        <p:cTn id="26" dur="1" fill="hold">
+                                          <p:stCondLst>
+                                            <p:cond delay="0"/>
+                                          </p:stCondLst>
+                                        </p:cTn>
+                                        <p:tgtEl>
+                                          <p:spTgt spid="10">
+                                            <p:txEl>
+                                              <p:pRg st="0" end="0"/>
+                                            </p:txEl>
+                                          </p:spTgt>
+                                        </p:tgtEl>
+                                        <p:attrNameLst>
+                                          <p:attrName>style.visibility</p:attrName>
+                                        </p:attrNameLst>
+                                      </p:cBhvr>
+                                      <p:to>
+                                        <p:strVal val="visible"/>
+                                      </p:to>
+                                    </p:set>
+                                  </p:childTnLst>
+                                </p:cTn>
+                              </p:par>
+                              <p:par>
+                                <p:cTn id="27" presetID="1" presetClass="entr" presetSubtype="0" fill="hold" nodeType="withEffect">
+                                  <p:stCondLst>
+                                    <p:cond delay="0"/>
+                                  </p:stCondLst>
+                                  <p:childTnLst>
+                                    <p:set>
+                                      <p:cBhvr>
+                                        <p:cTn id="28" dur="1" fill="hold">
+                                          <p:stCondLst>
+                                            <p:cond delay="0"/>
+                                          </p:stCondLst>
+                                        </p:cTn>
+                                        <p:tgtEl>
+                                          <p:spTgt spid="10">
+                                            <p:txEl>
+                                              <p:pRg st="1" end="1"/>
+                                            </p:txEl>
+                                          </p:spTgt>
+                                        </p:tgtEl>
+                                        <p:attrNameLst>
+                                          <p:attrName>style.visibility</p:attrName>
+                                        </p:attrNameLst>
+                                      </p:cBhvr>
+                                      <p:to>
+                                        <p:strVal val="visible"/>
+                                      </p:to>
+                                    </p:set>
+                                  </p:childTnLst>
+                                </p:cTn>
+                              </p:par>
+                              <p:par>
+                                <p:cTn id="29" presetID="1" presetClass="entr" presetSubtype="0" fill="hold" nodeType="withEffect">
+                                  <p:stCondLst>
+                                    <p:cond delay="0"/>
+                                  </p:stCondLst>
+                                  <p:childTnLst>
+                                    <p:set>
+                                      <p:cBhvr>
+                                        <p:cTn id="30" dur="1" fill="hold">
+                                          <p:stCondLst>
+                                            <p:cond delay="0"/>
+                                          </p:stCondLst>
+                                        </p:cTn>
+                                        <p:tgtEl>
+                                          <p:spTgt spid="10">
+                                            <p:txEl>
+                                              <p:pRg st="2" end="2"/>
+                                            </p:txEl>
+                                          </p:spTgt>
+                                        </p:tgtEl>
+                                        <p:attrNameLst>
+                                          <p:attrName>style.visibility</p:attrName>
+                                        </p:attrNameLst>
+                                      </p:cBhvr>
+                                      <p:to>
+                                        <p:strVal val="visible"/>
+                                      </p:to>
+                                    </p:set>
+                                  </p:childTnLst>
+                                </p:cTn>
+                              </p:par>
+                              <p:par>
+                                <p:cTn id="31" presetID="1" presetClass="entr" presetSubtype="0" fill="hold" nodeType="withEffect">
+                                  <p:stCondLst>
+                                    <p:cond delay="0"/>
+                                  </p:stCondLst>
+                                  <p:childTnLst>
+                                    <p:set>
+                                      <p:cBhvr>
+                                        <p:cTn id="32" dur="1" fill="hold">
+                                          <p:stCondLst>
+                                            <p:cond delay="0"/>
+                                          </p:stCondLst>
+                                        </p:cTn>
+                                        <p:tgtEl>
+                                          <p:spTgt spid="10">
+                                            <p:txEl>
+                                              <p:pRg st="3" end="3"/>
+                                            </p:txEl>
+                                          </p:spTgt>
+                                        </p:tgtEl>
+                                        <p:attrNameLst>
+                                          <p:attrName>style.visibility</p:attrName>
+                                        </p:attrNameLst>
+                                      </p:cBhvr>
+                                      <p:to>
+                                        <p:strVal val="visible"/>
+                                      </p:to>
+                                    </p:set>
+                                  </p:childTnLst>
+                                </p:cTn>
+                              </p:par>
+                              <p:par>
+                                <p:cTn id="33" presetID="1" presetClass="entr" presetSubtype="0" fill="hold" nodeType="withEffect">
+                                  <p:stCondLst>
+                                    <p:cond delay="0"/>
+                                  </p:stCondLst>
+                                  <p:childTnLst>
+                                    <p:set>
+                                      <p:cBhvr>
+                                        <p:cTn id="34" dur="1" fill="hold">
+                                          <p:stCondLst>
+                                            <p:cond delay="0"/>
+                                          </p:stCondLst>
+                                        </p:cTn>
+                                        <p:tgtEl>
+                                          <p:spTgt spid="10">
+                                            <p:txEl>
+                                              <p:pRg st="4" end="4"/>
+                                            </p:txEl>
+                                          </p:spTgt>
+                                        </p:tgtEl>
+                                        <p:attrNameLst>
+                                          <p:attrName>style.visibility</p:attrName>
+                                        </p:attrNameLst>
+                                      </p:cBhvr>
+                                      <p:to>
+                                        <p:strVal val="visible"/>
+                                      </p:to>
+                                    </p:set>
+                                  </p:childTnLst>
+                                </p:cTn>
+                              </p:par>
+                              <p:par>
+                                <p:cTn id="35" presetID="1" presetClass="entr" presetSubtype="0" fill="hold" nodeType="withEffect">
+                                  <p:stCondLst>
+                                    <p:cond delay="0"/>
+                                  </p:stCondLst>
+                                  <p:childTnLst>
+                                    <p:set>
+                                      <p:cBhvr>
+                                        <p:cTn id="36" dur="1" fill="hold">
+                                          <p:stCondLst>
+                                            <p:cond delay="0"/>
+                                          </p:stCondLst>
+                                        </p:cTn>
+                                        <p:tgtEl>
+                                          <p:spTgt spid="10">
+                                            <p:txEl>
+                                              <p:pRg st="5" end="5"/>
+                                            </p:txEl>
+                                          </p:spTgt>
+                                        </p:tgtEl>
+                                        <p:attrNameLst>
+                                          <p:attrName>style.visibility</p:attrName>
+                                        </p:attrNameLst>
+                                      </p:cBhvr>
+                                      <p:to>
+                                        <p:strVal val="visible"/>
+                                      </p:to>
+                                    </p:set>
+                                  </p:childTnLst>
+                                </p:cTn>
+                              </p:par>
+                              <p:par>
+                                <p:cTn id="37" presetID="1" presetClass="entr" presetSubtype="0" fill="hold" nodeType="withEffect">
+                                  <p:stCondLst>
+                                    <p:cond delay="0"/>
+                                  </p:stCondLst>
+                                  <p:childTnLst>
+                                    <p:set>
+                                      <p:cBhvr>
+                                        <p:cTn id="38" dur="1" fill="hold">
+                                          <p:stCondLst>
+                                            <p:cond delay="0"/>
+                                          </p:stCondLst>
+                                        </p:cTn>
+                                        <p:tgtEl>
+                                          <p:spTgt spid="10">
+                                            <p:txEl>
+                                              <p:pRg st="6" end="6"/>
+                                            </p:txEl>
+                                          </p:spTgt>
+                                        </p:tgtEl>
+                                        <p:attrNameLst>
+                                          <p:attrName>style.visibility</p:attrName>
+                                        </p:attrNameLst>
+                                      </p:cBhvr>
+                                      <p:to>
+                                        <p:strVal val="visible"/>
+                                      </p:to>
+                                    </p:set>
+                                  </p:childTnLst>
+                                </p:cTn>
+                              </p:par>
+                            </p:childTnLst>
+                          </p:cTn>
+                        </p:par>
+                      </p:childTnLst>
+                    </p:cTn>
+                  </p:par>
+                  <p:par>
+                    <p:cTn id="39" fill="hold">
+                      <p:stCondLst>
+                        <p:cond delay="indefinite"/>
+                      </p:stCondLst>
+                      <p:childTnLst>
+                        <p:par>
+                          <p:cTn id="40" fill="hold">
+                            <p:stCondLst>
+                              <p:cond delay="0"/>
+                            </p:stCondLst>
+                            <p:childTnLst>
+                              <p:par>
+                                <p:cTn id="41" presetID="1" presetClass="entr" presetSubtype="0" fill="hold" nodeType="clickEffect">
+                                  <p:stCondLst>
+                                    <p:cond delay="0"/>
+                                  </p:stCondLst>
+                                  <p:childTnLst>
+                                    <p:set>
+                                      <p:cBhvr>
+                                        <p:cTn id="42" dur="1" fill="hold">
+                                          <p:stCondLst>
+                                            <p:cond delay="0"/>
+                                          </p:stCondLst>
+                                        </p:cTn>
+                                        <p:tgtEl>
+                                          <p:spTgt spid="10">
+                                            <p:txEl>
+                                              <p:pRg st="8" end="8"/>
+                                            </p:txEl>
+                                          </p:spTgt>
+                                        </p:tgtEl>
+                                        <p:attrNameLst>
+                                          <p:attrName>style.visibility</p:attrName>
+                                        </p:attrNameLst>
+                                      </p:cBhvr>
+                                      <p:to>
+                                        <p:strVal val="visible"/>
+                                      </p:to>
+                                    </p:set>
+                                  </p:childTnLst>
+                                </p:cTn>
+                              </p:par>
+                            </p:childTnLst>
+                          </p:cTn>
+                        </p:par>
+                      </p:childTnLst>
+                    </p:cTn>
+                  </p:par>
+                </p:childTnLst>
+              </p:cTn>
+              <p:prevCondLst>
+                <p:cond evt="onPrev" delay="0">
+                  <p:tgtEl>
+                    <p:sldTgt/>
+                  </p:tgtEl>
+                </p:cond>
+              </p:prevCondLst>
+              <p:nextCondLst>
+                <p:cond evt="onNext" delay="0">
+                  <p:tgtEl>
+                    <p:sldTgt/>
+                  </p:tgtEl>
+                </p:cond>
+              </p:nextCondLst>
+            </p:seq>
+          </p:childTnLst>
+        </p:cTn>
+      </p:par>
+    </p:tnLst>
+  </p:timing>
 </p:sld>
 </file>
 
-<file path=ppt/slides/slide8.xml><?xml version="1.0" encoding="utf-8"?>
+<file path=ppt/slides/slide7.xml><?xml version="1.0" encoding="utf-8"?>
 <p:sld xmlns:a="http://schemas.openxmlformats.org/drawingml/2006/main" xmlns:r="http://schemas.openxmlformats.org/officeDocument/2006/relationships" xmlns:p="http://schemas.openxmlformats.org/presentationml/2006/main">
   <p:cSld>
+    <p:bg>
+      <p:bgPr>
+        <a:solidFill>
+          <a:schemeClr val="bg2">
+            <a:lumMod val="75000"/>
+          </a:schemeClr>
+        </a:solidFill>
+        <a:effectLst/>
+      </p:bgPr>
+    </p:bg>
     <p:spTree>
       <p:nvGrpSpPr>
         <p:cNvPr id="1" name=""/>
@@ -4537,38 +6711,10 @@
       </p:grpSpPr>
       <p:sp>
         <p:nvSpPr>
-          <p:cNvPr id="2" name="Title 1">
-            <a:extLst>
-              <a:ext uri="{FF2B5EF4-FFF2-40B4-BE49-F238E27FC236}">
-                <a16:creationId xmlns:a16="http://schemas.microsoft.com/office/drawing/2014/main" id="{5C6486EB-3BA0-1319-4B72-AB7924700243}"/>
-              </a:ext>
-            </a:extLst>
-          </p:cNvPr>
-          <p:cNvSpPr>
-            <a:spLocks noGrp="1"/>
-          </p:cNvSpPr>
-          <p:nvPr>
-            <p:ph type="title"/>
-          </p:nvPr>
-        </p:nvSpPr>
-        <p:spPr/>
-        <p:txBody>
-          <a:bodyPr/>
-          <a:lstStyle/>
-          <a:p>
-            <a:r>
-              <a:rPr lang="en-US" dirty="0"/>
-              <a:t>Step 6: Brainstorm Tools and Assignments</a:t>
-            </a:r>
-          </a:p>
-        </p:txBody>
-      </p:sp>
-      <p:sp>
-        <p:nvSpPr>
           <p:cNvPr id="3" name="Content Placeholder 2">
             <a:extLst>
               <a:ext uri="{FF2B5EF4-FFF2-40B4-BE49-F238E27FC236}">
-                <a16:creationId xmlns:a16="http://schemas.microsoft.com/office/drawing/2014/main" id="{7F32E327-A7BD-162E-4DBC-C0DF185A229E}"/>
+                <a16:creationId xmlns:a16="http://schemas.microsoft.com/office/drawing/2014/main" id="{A0C1FE4C-4A10-A010-9E5E-21F921CEC711}"/>
               </a:ext>
             </a:extLst>
           </p:cNvPr>
@@ -4579,80 +6725,246 @@
             <p:ph idx="1"/>
           </p:nvPr>
         </p:nvSpPr>
-        <p:spPr/>
-        <p:txBody>
-          <a:bodyPr/>
+        <p:spPr>
+          <a:xfrm>
+            <a:off x="121023" y="1436571"/>
+            <a:ext cx="8085372" cy="5421428"/>
+          </a:xfrm>
+        </p:spPr>
+        <p:txBody>
+          <a:bodyPr>
+            <a:normAutofit fontScale="70000" lnSpcReduction="20000"/>
+          </a:bodyPr>
           <a:lstStyle/>
           <a:p>
+            <a:pPr marL="0" indent="0">
+              <a:buNone/>
+            </a:pPr>
+            <a:r>
+              <a:rPr lang="en-US" u="sng" dirty="0"/>
+              <a:t>Why drafting is important</a:t>
+            </a:r>
             <a:r>
               <a:rPr lang="en-US" dirty="0"/>
-              <a:t>Tools</a:t>
-            </a:r>
-          </a:p>
-          <a:p>
-            <a:pPr lvl="1">
-              <a:buFont typeface="Courier New" panose="02070309020205020404" pitchFamily="49" charset="0"/>
-              <a:buChar char="o"/>
+              <a:t>: it allows me to modify and expand upon my initial ideas, organize the content in a meaningful way, make the content more concise, etc.</a:t>
+            </a:r>
+          </a:p>
+          <a:p>
+            <a:pPr marL="0" indent="0">
+              <a:buNone/>
             </a:pPr>
-            <a:r>
-              <a:rPr lang="en-US" dirty="0" err="1"/>
-              <a:t>Qiskit</a:t>
+            <a:endParaRPr lang="en-US" dirty="0"/>
+          </a:p>
+          <a:p>
+            <a:pPr marL="0" indent="0">
+              <a:buNone/>
+            </a:pPr>
+            <a:r>
+              <a:rPr lang="en-US" u="sng" dirty="0"/>
+              <a:t>Draft 1</a:t>
             </a:r>
             <a:r>
               <a:rPr lang="en-US" dirty="0"/>
-              <a:t> website for use of the </a:t>
-            </a:r>
-            <a:r>
-              <a:rPr lang="en-US" dirty="0" err="1"/>
-              <a:t>qiskit</a:t>
-            </a:r>
+              <a:t> (lecture_topics.txt): </a:t>
+            </a:r>
+          </a:p>
+          <a:p>
+            <a:pPr marL="0" indent="0">
+              <a:buNone/>
+            </a:pPr>
             <a:r>
               <a:rPr lang="en-US" dirty="0"/>
-              <a:t> library</a:t>
-            </a:r>
-          </a:p>
-          <a:p>
-            <a:pPr lvl="1">
-              <a:buFont typeface="Courier New" panose="02070309020205020404" pitchFamily="49" charset="0"/>
-              <a:buChar char="o"/>
+              <a:t>Lengthy; unnecessary topics; unorganized; too complex of a substitute for linear algebra</a:t>
+            </a:r>
+          </a:p>
+          <a:p>
+            <a:pPr marL="0" indent="0">
+              <a:buNone/>
             </a:pPr>
+            <a:endParaRPr lang="en-US" dirty="0"/>
+          </a:p>
+          <a:p>
+            <a:pPr marL="0" indent="0">
+              <a:buNone/>
+            </a:pPr>
+            <a:r>
+              <a:rPr lang="en-US" u="sng" dirty="0"/>
+              <a:t>Draft 2</a:t>
+            </a:r>
             <a:r>
               <a:rPr lang="en-US" dirty="0"/>
-              <a:t>IBM website for creating quantum circuits and simulating them on real quantum computers</a:t>
-            </a:r>
-          </a:p>
-          <a:p>
+              <a:t> (lecture_outline_DRAFT.txt):</a:t>
+            </a:r>
+          </a:p>
+          <a:p>
+            <a:pPr marL="0" indent="0">
+              <a:buNone/>
+            </a:pPr>
             <a:r>
               <a:rPr lang="en-US" dirty="0"/>
-              <a:t>Assignments</a:t>
-            </a:r>
-          </a:p>
-          <a:p>
-            <a:pPr lvl="1">
-              <a:buFont typeface="Courier New" panose="02070309020205020404" pitchFamily="49" charset="0"/>
-              <a:buChar char="o"/>
+              <a:t>Better structured, but can be improved; still has some unnecessary topics; lacking complexity theory relevance</a:t>
+            </a:r>
+          </a:p>
+          <a:p>
+            <a:pPr marL="0" indent="0">
+              <a:buNone/>
             </a:pPr>
+            <a:endParaRPr lang="en-US" dirty="0"/>
+          </a:p>
+          <a:p>
+            <a:pPr marL="0" indent="0">
+              <a:buNone/>
+            </a:pPr>
+            <a:r>
+              <a:rPr lang="en-US" u="sng" dirty="0"/>
+              <a:t>Draft 3</a:t>
+            </a:r>
             <a:r>
               <a:rPr lang="en-US" dirty="0"/>
-              <a:t>Some theory and some practice</a:t>
-            </a:r>
-          </a:p>
-          <a:p>
-            <a:pPr lvl="1">
-              <a:buFont typeface="Courier New" panose="02070309020205020404" pitchFamily="49" charset="0"/>
-              <a:buChar char="o"/>
+              <a:t> (lecture_outline_DRAFT_2.txt):</a:t>
+            </a:r>
+          </a:p>
+          <a:p>
+            <a:pPr marL="0" indent="0">
+              <a:buNone/>
             </a:pPr>
             <a:r>
               <a:rPr lang="en-US" dirty="0"/>
-              <a:t>(Pending)</a:t>
-            </a:r>
-          </a:p>
-        </p:txBody>
-      </p:sp>
+              <a:t>Only (for the most part) has essential topics; has complexity theory; organized well; sections are too big (not digestible sizes)</a:t>
+            </a:r>
+          </a:p>
+          <a:p>
+            <a:pPr marL="0" indent="0">
+              <a:buNone/>
+            </a:pPr>
+            <a:endParaRPr lang="en-US" dirty="0"/>
+          </a:p>
+          <a:p>
+            <a:pPr marL="0" indent="0">
+              <a:buNone/>
+            </a:pPr>
+            <a:r>
+              <a:rPr lang="en-US" dirty="0"/>
+              <a:t>The graph will take the best parts of Draft 3 and work to make the sections smaller and more digestible.</a:t>
+            </a:r>
+          </a:p>
+        </p:txBody>
+      </p:sp>
+      <p:sp>
+        <p:nvSpPr>
+          <p:cNvPr id="7" name="Title 1">
+            <a:extLst>
+              <a:ext uri="{FF2B5EF4-FFF2-40B4-BE49-F238E27FC236}">
+                <a16:creationId xmlns:a16="http://schemas.microsoft.com/office/drawing/2014/main" id="{E37ACE4D-19AC-B073-B597-8C6D514A5530}"/>
+              </a:ext>
+            </a:extLst>
+          </p:cNvPr>
+          <p:cNvSpPr txBox="1">
+            <a:spLocks/>
+          </p:cNvSpPr>
+          <p:nvPr/>
+        </p:nvSpPr>
+        <p:spPr>
+          <a:xfrm>
+            <a:off x="0" y="1"/>
+            <a:ext cx="12192000" cy="1285874"/>
+          </a:xfrm>
+          <a:prstGeom prst="rect">
+            <a:avLst/>
+          </a:prstGeom>
+          <a:solidFill>
+            <a:schemeClr val="tx1"/>
+          </a:solidFill>
+        </p:spPr>
+        <p:txBody>
+          <a:bodyPr vert="horz" lIns="91440" tIns="45720" rIns="91440" bIns="45720" rtlCol="0" anchor="ctr">
+            <a:normAutofit/>
+          </a:bodyPr>
+          <a:lstStyle>
+            <a:lvl1pPr algn="l" defTabSz="914400" rtl="0" eaLnBrk="1" latinLnBrk="0" hangingPunct="1">
+              <a:lnSpc>
+                <a:spcPct val="90000"/>
+              </a:lnSpc>
+              <a:spcBef>
+                <a:spcPct val="0"/>
+              </a:spcBef>
+              <a:buNone/>
+              <a:defRPr sz="4400" kern="1200">
+                <a:solidFill>
+                  <a:schemeClr val="tx1"/>
+                </a:solidFill>
+                <a:latin typeface="+mj-lt"/>
+                <a:ea typeface="+mj-ea"/>
+                <a:cs typeface="+mj-cs"/>
+              </a:defRPr>
+            </a:lvl1pPr>
+          </a:lstStyle>
+          <a:p>
+            <a:pPr algn="ctr"/>
+            <a:r>
+              <a:rPr lang="en-US" u="sng" dirty="0">
+                <a:solidFill>
+                  <a:schemeClr val="bg1">
+                    <a:lumMod val="85000"/>
+                  </a:schemeClr>
+                </a:solidFill>
+              </a:rPr>
+              <a:t>Step 2</a:t>
+            </a:r>
+            <a:r>
+              <a:rPr lang="en-US" dirty="0">
+                <a:solidFill>
+                  <a:schemeClr val="bg1">
+                    <a:lumMod val="85000"/>
+                  </a:schemeClr>
+                </a:solidFill>
+              </a:rPr>
+              <a:t>: Draft Lecture Outlines</a:t>
+            </a:r>
+            <a:endParaRPr lang="en-US" u="sng" dirty="0">
+              <a:solidFill>
+                <a:schemeClr val="bg1">
+                  <a:lumMod val="85000"/>
+                </a:schemeClr>
+              </a:solidFill>
+            </a:endParaRPr>
+          </a:p>
+        </p:txBody>
+      </p:sp>
+      <p:pic>
+        <p:nvPicPr>
+          <p:cNvPr id="12" name="Picture 11">
+            <a:extLst>
+              <a:ext uri="{FF2B5EF4-FFF2-40B4-BE49-F238E27FC236}">
+                <a16:creationId xmlns:a16="http://schemas.microsoft.com/office/drawing/2014/main" id="{241AF690-C21A-C8C3-46F1-63B9017AD2AF}"/>
+              </a:ext>
+            </a:extLst>
+          </p:cNvPr>
+          <p:cNvPicPr>
+            <a:picLocks noChangeAspect="1"/>
+          </p:cNvPicPr>
+          <p:nvPr/>
+        </p:nvPicPr>
+        <p:blipFill>
+          <a:blip r:embed="rId2"/>
+          <a:stretch>
+            <a:fillRect/>
+          </a:stretch>
+        </p:blipFill>
+        <p:spPr>
+          <a:xfrm>
+            <a:off x="7682753" y="4442581"/>
+            <a:ext cx="4509247" cy="1796854"/>
+          </a:xfrm>
+          <a:prstGeom prst="rect">
+            <a:avLst/>
+          </a:prstGeom>
+        </p:spPr>
+      </p:pic>
     </p:spTree>
     <p:extLst>
       <p:ext uri="{BB962C8B-B14F-4D97-AF65-F5344CB8AC3E}">
-        <p14:creationId xmlns:p14="http://schemas.microsoft.com/office/powerpoint/2010/main" val="3573531070"/>
+        <p14:creationId xmlns:p14="http://schemas.microsoft.com/office/powerpoint/2010/main" val="3444169678"/>
       </p:ext>
     </p:extLst>
   </p:cSld>
@@ -4662,9 +6974,19 @@
 </p:sld>
 </file>
 
-<file path=ppt/slides/slide9.xml><?xml version="1.0" encoding="utf-8"?>
+<file path=ppt/slides/slide8.xml><?xml version="1.0" encoding="utf-8"?>
 <p:sld xmlns:a="http://schemas.openxmlformats.org/drawingml/2006/main" xmlns:r="http://schemas.openxmlformats.org/officeDocument/2006/relationships" xmlns:p="http://schemas.openxmlformats.org/presentationml/2006/main">
   <p:cSld>
+    <p:bg>
+      <p:bgPr>
+        <a:solidFill>
+          <a:schemeClr val="bg2">
+            <a:lumMod val="75000"/>
+          </a:schemeClr>
+        </a:solidFill>
+        <a:effectLst/>
+      </p:bgPr>
+    </p:bg>
     <p:spTree>
       <p:nvGrpSpPr>
         <p:cNvPr id="1" name=""/>
@@ -4681,10 +7003,490 @@
       </p:grpSpPr>
       <p:sp>
         <p:nvSpPr>
+          <p:cNvPr id="3" name="Content Placeholder 2">
+            <a:extLst>
+              <a:ext uri="{FF2B5EF4-FFF2-40B4-BE49-F238E27FC236}">
+                <a16:creationId xmlns:a16="http://schemas.microsoft.com/office/drawing/2014/main" id="{A3113824-5BF9-9CEC-16DA-0C6C6BF0B3C5}"/>
+              </a:ext>
+            </a:extLst>
+          </p:cNvPr>
+          <p:cNvSpPr>
+            <a:spLocks noGrp="1"/>
+          </p:cNvSpPr>
+          <p:nvPr>
+            <p:ph idx="1"/>
+          </p:nvPr>
+        </p:nvSpPr>
+        <p:spPr>
+          <a:xfrm>
+            <a:off x="156882" y="1899751"/>
+            <a:ext cx="6537775" cy="4351338"/>
+          </a:xfrm>
+        </p:spPr>
+        <p:txBody>
+          <a:bodyPr>
+            <a:normAutofit fontScale="92500" lnSpcReduction="20000"/>
+          </a:bodyPr>
+          <a:lstStyle/>
+          <a:p>
+            <a:pPr marL="0" indent="0" algn="ctr">
+              <a:buNone/>
+            </a:pPr>
+            <a:r>
+              <a:rPr lang="en-US" u="sng" dirty="0"/>
+              <a:t>Why use a graph?</a:t>
+            </a:r>
+            <a:r>
+              <a:rPr lang="en-US" dirty="0"/>
+              <a:t> </a:t>
+            </a:r>
+          </a:p>
+          <a:p>
+            <a:pPr marL="0" indent="0">
+              <a:buNone/>
+            </a:pPr>
+            <a:endParaRPr lang="en-US" dirty="0"/>
+          </a:p>
+          <a:p>
+            <a:pPr marL="514350" indent="-514350">
+              <a:buAutoNum type="arabicPeriod"/>
+            </a:pPr>
+            <a:r>
+              <a:rPr lang="en-US" dirty="0"/>
+              <a:t>So that others can use, rearrange, and build upon my current design. </a:t>
+            </a:r>
+          </a:p>
+          <a:p>
+            <a:pPr marL="514350" indent="-514350">
+              <a:buAutoNum type="arabicPeriod"/>
+            </a:pPr>
+            <a:endParaRPr lang="en-US" dirty="0"/>
+          </a:p>
+          <a:p>
+            <a:pPr marL="514350" indent="-514350">
+              <a:buAutoNum type="arabicPeriod"/>
+            </a:pPr>
+            <a:r>
+              <a:rPr lang="en-US" dirty="0"/>
+              <a:t>To help future learners of quantum computing by providing a roadmap of topics to learn and in what order.</a:t>
+            </a:r>
+          </a:p>
+          <a:p>
+            <a:pPr marL="514350" indent="-514350">
+              <a:buAutoNum type="arabicPeriod"/>
+            </a:pPr>
+            <a:endParaRPr lang="en-US" dirty="0"/>
+          </a:p>
+          <a:p>
+            <a:pPr marL="514350" indent="-514350">
+              <a:buAutoNum type="arabicPeriod"/>
+            </a:pPr>
+            <a:r>
+              <a:rPr lang="en-US" dirty="0"/>
+              <a:t>To allow for an easy way to reorganize the structure of the learning path by moving around the nodes.</a:t>
+            </a:r>
+          </a:p>
+          <a:p>
+            <a:pPr marL="0" indent="0">
+              <a:buNone/>
+            </a:pPr>
+            <a:endParaRPr lang="en-US" u="sng" dirty="0"/>
+          </a:p>
+        </p:txBody>
+      </p:sp>
+      <p:sp>
+        <p:nvSpPr>
+          <p:cNvPr id="4" name="Title 1">
+            <a:extLst>
+              <a:ext uri="{FF2B5EF4-FFF2-40B4-BE49-F238E27FC236}">
+                <a16:creationId xmlns:a16="http://schemas.microsoft.com/office/drawing/2014/main" id="{83362049-02C8-DC9E-E47F-BE6C1371E2A1}"/>
+              </a:ext>
+            </a:extLst>
+          </p:cNvPr>
+          <p:cNvSpPr txBox="1">
+            <a:spLocks/>
+          </p:cNvSpPr>
+          <p:nvPr/>
+        </p:nvSpPr>
+        <p:spPr>
+          <a:xfrm>
+            <a:off x="0" y="1"/>
+            <a:ext cx="12192000" cy="1285874"/>
+          </a:xfrm>
+          <a:prstGeom prst="rect">
+            <a:avLst/>
+          </a:prstGeom>
+          <a:solidFill>
+            <a:schemeClr val="tx1"/>
+          </a:solidFill>
+        </p:spPr>
+        <p:txBody>
+          <a:bodyPr vert="horz" lIns="91440" tIns="45720" rIns="91440" bIns="45720" rtlCol="0" anchor="ctr">
+            <a:normAutofit/>
+          </a:bodyPr>
+          <a:lstStyle>
+            <a:lvl1pPr algn="l" defTabSz="914400" rtl="0" eaLnBrk="1" latinLnBrk="0" hangingPunct="1">
+              <a:lnSpc>
+                <a:spcPct val="90000"/>
+              </a:lnSpc>
+              <a:spcBef>
+                <a:spcPct val="0"/>
+              </a:spcBef>
+              <a:buNone/>
+              <a:defRPr sz="4400" kern="1200">
+                <a:solidFill>
+                  <a:schemeClr val="tx1"/>
+                </a:solidFill>
+                <a:latin typeface="+mj-lt"/>
+                <a:ea typeface="+mj-ea"/>
+                <a:cs typeface="+mj-cs"/>
+              </a:defRPr>
+            </a:lvl1pPr>
+          </a:lstStyle>
+          <a:p>
+            <a:pPr algn="ctr"/>
+            <a:r>
+              <a:rPr lang="en-US" u="sng" dirty="0">
+                <a:solidFill>
+                  <a:schemeClr val="bg1">
+                    <a:lumMod val="85000"/>
+                  </a:schemeClr>
+                </a:solidFill>
+              </a:rPr>
+              <a:t>Step 3</a:t>
+            </a:r>
+            <a:r>
+              <a:rPr lang="en-US" dirty="0">
+                <a:solidFill>
+                  <a:schemeClr val="bg1">
+                    <a:lumMod val="85000"/>
+                  </a:schemeClr>
+                </a:solidFill>
+              </a:rPr>
+              <a:t>: Encode Knowledge Into Graph</a:t>
+            </a:r>
+            <a:endParaRPr lang="en-US" u="sng" dirty="0">
+              <a:solidFill>
+                <a:schemeClr val="bg1">
+                  <a:lumMod val="85000"/>
+                </a:schemeClr>
+              </a:solidFill>
+            </a:endParaRPr>
+          </a:p>
+        </p:txBody>
+      </p:sp>
+      <p:pic>
+        <p:nvPicPr>
+          <p:cNvPr id="5" name="Picture 4">
+            <a:extLst>
+              <a:ext uri="{FF2B5EF4-FFF2-40B4-BE49-F238E27FC236}">
+                <a16:creationId xmlns:a16="http://schemas.microsoft.com/office/drawing/2014/main" id="{32613757-9D2A-A386-6C85-ACD93F29D60C}"/>
+              </a:ext>
+            </a:extLst>
+          </p:cNvPr>
+          <p:cNvPicPr>
+            <a:picLocks noChangeAspect="1"/>
+          </p:cNvPicPr>
+          <p:nvPr/>
+        </p:nvPicPr>
+        <p:blipFill rotWithShape="1">
+          <a:blip r:embed="rId2">
+            <a:extLst>
+              <a:ext uri="{28A0092B-C50C-407E-A947-70E740481C1C}">
+                <a14:useLocalDpi xmlns:a14="http://schemas.microsoft.com/office/drawing/2010/main" val="0"/>
+              </a:ext>
+            </a:extLst>
+          </a:blip>
+          <a:srcRect r="59310" b="32810"/>
+          <a:stretch/>
+        </p:blipFill>
+        <p:spPr>
+          <a:xfrm>
+            <a:off x="6695676" y="1285876"/>
+            <a:ext cx="5496324" cy="5572124"/>
+          </a:xfrm>
+          <a:prstGeom prst="rect">
+            <a:avLst/>
+          </a:prstGeom>
+          <a:ln w="38100">
+            <a:solidFill>
+              <a:schemeClr val="tx1"/>
+            </a:solidFill>
+          </a:ln>
+        </p:spPr>
+      </p:pic>
+    </p:spTree>
+    <p:extLst>
+      <p:ext uri="{BB962C8B-B14F-4D97-AF65-F5344CB8AC3E}">
+        <p14:creationId xmlns:p14="http://schemas.microsoft.com/office/powerpoint/2010/main" val="3784721756"/>
+      </p:ext>
+    </p:extLst>
+  </p:cSld>
+  <p:clrMapOvr>
+    <a:masterClrMapping/>
+  </p:clrMapOvr>
+  <p:timing>
+    <p:tnLst>
+      <p:par>
+        <p:cTn id="1" dur="indefinite" restart="never" nodeType="tmRoot">
+          <p:childTnLst>
+            <p:seq concurrent="1" nextAc="seek">
+              <p:cTn id="2" dur="indefinite" nodeType="mainSeq">
+                <p:childTnLst>
+                  <p:par>
+                    <p:cTn id="3" fill="hold">
+                      <p:stCondLst>
+                        <p:cond delay="indefinite"/>
+                      </p:stCondLst>
+                      <p:childTnLst>
+                        <p:par>
+                          <p:cTn id="4" fill="hold">
+                            <p:stCondLst>
+                              <p:cond delay="0"/>
+                            </p:stCondLst>
+                            <p:childTnLst>
+                              <p:par>
+                                <p:cTn id="5" presetID="1" presetClass="entr" presetSubtype="0" fill="hold" nodeType="clickEffect">
+                                  <p:stCondLst>
+                                    <p:cond delay="0"/>
+                                  </p:stCondLst>
+                                  <p:childTnLst>
+                                    <p:set>
+                                      <p:cBhvr>
+                                        <p:cTn id="6" dur="1" fill="hold">
+                                          <p:stCondLst>
+                                            <p:cond delay="0"/>
+                                          </p:stCondLst>
+                                        </p:cTn>
+                                        <p:tgtEl>
+                                          <p:spTgt spid="3">
+                                            <p:txEl>
+                                              <p:pRg st="0" end="0"/>
+                                            </p:txEl>
+                                          </p:spTgt>
+                                        </p:tgtEl>
+                                        <p:attrNameLst>
+                                          <p:attrName>style.visibility</p:attrName>
+                                        </p:attrNameLst>
+                                      </p:cBhvr>
+                                      <p:to>
+                                        <p:strVal val="visible"/>
+                                      </p:to>
+                                    </p:set>
+                                  </p:childTnLst>
+                                </p:cTn>
+                              </p:par>
+                            </p:childTnLst>
+                          </p:cTn>
+                        </p:par>
+                      </p:childTnLst>
+                    </p:cTn>
+                  </p:par>
+                  <p:par>
+                    <p:cTn id="7" fill="hold">
+                      <p:stCondLst>
+                        <p:cond delay="indefinite"/>
+                      </p:stCondLst>
+                      <p:childTnLst>
+                        <p:par>
+                          <p:cTn id="8" fill="hold">
+                            <p:stCondLst>
+                              <p:cond delay="0"/>
+                            </p:stCondLst>
+                            <p:childTnLst>
+                              <p:par>
+                                <p:cTn id="9" presetID="1" presetClass="entr" presetSubtype="0" fill="hold" nodeType="clickEffect">
+                                  <p:stCondLst>
+                                    <p:cond delay="0"/>
+                                  </p:stCondLst>
+                                  <p:childTnLst>
+                                    <p:set>
+                                      <p:cBhvr>
+                                        <p:cTn id="10" dur="1" fill="hold">
+                                          <p:stCondLst>
+                                            <p:cond delay="0"/>
+                                          </p:stCondLst>
+                                        </p:cTn>
+                                        <p:tgtEl>
+                                          <p:spTgt spid="3">
+                                            <p:txEl>
+                                              <p:pRg st="2" end="2"/>
+                                            </p:txEl>
+                                          </p:spTgt>
+                                        </p:tgtEl>
+                                        <p:attrNameLst>
+                                          <p:attrName>style.visibility</p:attrName>
+                                        </p:attrNameLst>
+                                      </p:cBhvr>
+                                      <p:to>
+                                        <p:strVal val="visible"/>
+                                      </p:to>
+                                    </p:set>
+                                  </p:childTnLst>
+                                </p:cTn>
+                              </p:par>
+                            </p:childTnLst>
+                          </p:cTn>
+                        </p:par>
+                      </p:childTnLst>
+                    </p:cTn>
+                  </p:par>
+                  <p:par>
+                    <p:cTn id="11" fill="hold">
+                      <p:stCondLst>
+                        <p:cond delay="indefinite"/>
+                      </p:stCondLst>
+                      <p:childTnLst>
+                        <p:par>
+                          <p:cTn id="12" fill="hold">
+                            <p:stCondLst>
+                              <p:cond delay="0"/>
+                            </p:stCondLst>
+                            <p:childTnLst>
+                              <p:par>
+                                <p:cTn id="13" presetID="1" presetClass="entr" presetSubtype="0" fill="hold" nodeType="clickEffect">
+                                  <p:stCondLst>
+                                    <p:cond delay="0"/>
+                                  </p:stCondLst>
+                                  <p:childTnLst>
+                                    <p:set>
+                                      <p:cBhvr>
+                                        <p:cTn id="14" dur="1" fill="hold">
+                                          <p:stCondLst>
+                                            <p:cond delay="0"/>
+                                          </p:stCondLst>
+                                        </p:cTn>
+                                        <p:tgtEl>
+                                          <p:spTgt spid="3">
+                                            <p:txEl>
+                                              <p:pRg st="4" end="4"/>
+                                            </p:txEl>
+                                          </p:spTgt>
+                                        </p:tgtEl>
+                                        <p:attrNameLst>
+                                          <p:attrName>style.visibility</p:attrName>
+                                        </p:attrNameLst>
+                                      </p:cBhvr>
+                                      <p:to>
+                                        <p:strVal val="visible"/>
+                                      </p:to>
+                                    </p:set>
+                                  </p:childTnLst>
+                                </p:cTn>
+                              </p:par>
+                            </p:childTnLst>
+                          </p:cTn>
+                        </p:par>
+                      </p:childTnLst>
+                    </p:cTn>
+                  </p:par>
+                  <p:par>
+                    <p:cTn id="15" fill="hold">
+                      <p:stCondLst>
+                        <p:cond delay="indefinite"/>
+                      </p:stCondLst>
+                      <p:childTnLst>
+                        <p:par>
+                          <p:cTn id="16" fill="hold">
+                            <p:stCondLst>
+                              <p:cond delay="0"/>
+                            </p:stCondLst>
+                            <p:childTnLst>
+                              <p:par>
+                                <p:cTn id="17" presetID="1" presetClass="entr" presetSubtype="0" fill="hold" nodeType="clickEffect">
+                                  <p:stCondLst>
+                                    <p:cond delay="0"/>
+                                  </p:stCondLst>
+                                  <p:childTnLst>
+                                    <p:set>
+                                      <p:cBhvr>
+                                        <p:cTn id="18" dur="1" fill="hold">
+                                          <p:stCondLst>
+                                            <p:cond delay="0"/>
+                                          </p:stCondLst>
+                                        </p:cTn>
+                                        <p:tgtEl>
+                                          <p:spTgt spid="3">
+                                            <p:txEl>
+                                              <p:pRg st="6" end="6"/>
+                                            </p:txEl>
+                                          </p:spTgt>
+                                        </p:tgtEl>
+                                        <p:attrNameLst>
+                                          <p:attrName>style.visibility</p:attrName>
+                                        </p:attrNameLst>
+                                      </p:cBhvr>
+                                      <p:to>
+                                        <p:strVal val="visible"/>
+                                      </p:to>
+                                    </p:set>
+                                  </p:childTnLst>
+                                </p:cTn>
+                              </p:par>
+                            </p:childTnLst>
+                          </p:cTn>
+                        </p:par>
+                      </p:childTnLst>
+                    </p:cTn>
+                  </p:par>
+                </p:childTnLst>
+              </p:cTn>
+              <p:prevCondLst>
+                <p:cond evt="onPrev" delay="0">
+                  <p:tgtEl>
+                    <p:sldTgt/>
+                  </p:tgtEl>
+                </p:cond>
+              </p:prevCondLst>
+              <p:nextCondLst>
+                <p:cond evt="onNext" delay="0">
+                  <p:tgtEl>
+                    <p:sldTgt/>
+                  </p:tgtEl>
+                </p:cond>
+              </p:nextCondLst>
+            </p:seq>
+          </p:childTnLst>
+        </p:cTn>
+      </p:par>
+    </p:tnLst>
+  </p:timing>
+</p:sld>
+</file>
+
+<file path=ppt/slides/slide9.xml><?xml version="1.0" encoding="utf-8"?>
+<p:sld xmlns:a="http://schemas.openxmlformats.org/drawingml/2006/main" xmlns:r="http://schemas.openxmlformats.org/officeDocument/2006/relationships" xmlns:p="http://schemas.openxmlformats.org/presentationml/2006/main">
+  <p:cSld>
+    <p:bg>
+      <p:bgPr>
+        <a:solidFill>
+          <a:schemeClr val="bg2">
+            <a:lumMod val="75000"/>
+          </a:schemeClr>
+        </a:solidFill>
+        <a:effectLst/>
+      </p:bgPr>
+    </p:bg>
+    <p:spTree>
+      <p:nvGrpSpPr>
+        <p:cNvPr id="1" name=""/>
+        <p:cNvGrpSpPr/>
+        <p:nvPr/>
+      </p:nvGrpSpPr>
+      <p:grpSpPr>
+        <a:xfrm>
+          <a:off x="0" y="0"/>
+          <a:ext cx="0" cy="0"/>
+          <a:chOff x="0" y="0"/>
+          <a:chExt cx="0" cy="0"/>
+        </a:xfrm>
+      </p:grpSpPr>
+      <p:sp>
+        <p:nvSpPr>
           <p:cNvPr id="2" name="Title 1">
             <a:extLst>
               <a:ext uri="{FF2B5EF4-FFF2-40B4-BE49-F238E27FC236}">
-                <a16:creationId xmlns:a16="http://schemas.microsoft.com/office/drawing/2014/main" id="{76F6DE1B-EB60-5BB5-DA00-9288B73528CD}"/>
+                <a16:creationId xmlns:a16="http://schemas.microsoft.com/office/drawing/2014/main" id="{5C6486EB-3BA0-1319-4B72-AB7924700243}"/>
               </a:ext>
             </a:extLst>
           </p:cNvPr>
@@ -4702,7 +7504,7 @@
           <a:p>
             <a:r>
               <a:rPr lang="en-US" dirty="0"/>
-              <a:t>Sources</a:t>
+              <a:t>Step 6: Brainstorm Tools and Assignments</a:t>
             </a:r>
           </a:p>
         </p:txBody>
@@ -4712,7 +7514,7 @@
           <p:cNvPr id="3" name="Content Placeholder 2">
             <a:extLst>
               <a:ext uri="{FF2B5EF4-FFF2-40B4-BE49-F238E27FC236}">
-                <a16:creationId xmlns:a16="http://schemas.microsoft.com/office/drawing/2014/main" id="{94F68C2D-E4B1-FCF0-30FB-AC96684B1376}"/>
+                <a16:creationId xmlns:a16="http://schemas.microsoft.com/office/drawing/2014/main" id="{7F32E327-A7BD-162E-4DBC-C0DF185A229E}"/>
               </a:ext>
             </a:extLst>
           </p:cNvPr>
@@ -4725,84 +7527,78 @@
         </p:nvSpPr>
         <p:spPr/>
         <p:txBody>
-          <a:bodyPr>
-            <a:normAutofit/>
-          </a:bodyPr>
+          <a:bodyPr/>
           <a:lstStyle/>
           <a:p>
             <a:r>
-              <a:rPr lang="en-US" sz="2400" u="sng" dirty="0"/>
-              <a:t>IBM Quantum Field Guide</a:t>
-            </a:r>
-            <a:r>
-              <a:rPr lang="en-US" sz="2400" dirty="0"/>
-              <a:t>: </a:t>
-            </a:r>
-            <a:r>
-              <a:rPr lang="en-US" sz="1800" dirty="0"/>
-              <a:t>https://quantum-computing.ibm.com/lab/docs/iqx/guide</a:t>
-            </a:r>
-          </a:p>
-          <a:p>
-            <a:r>
-              <a:rPr lang="en-US" sz="2400" u="sng" dirty="0"/>
-              <a:t>Online lecture series</a:t>
-            </a:r>
-            <a:r>
-              <a:rPr lang="en-US" sz="2400" dirty="0"/>
-              <a:t>: </a:t>
-            </a:r>
-            <a:r>
-              <a:rPr lang="en-US" sz="1800" dirty="0"/>
-              <a:t>https://youtube.com/playlist?list=PLkespgaZN4gmu0nWNmfMflVRqw0VPkCGH</a:t>
-            </a:r>
-          </a:p>
-          <a:p>
-            <a:r>
-              <a:rPr lang="en-US" sz="2400" u="sng" dirty="0"/>
-              <a:t>Books</a:t>
-            </a:r>
-            <a:r>
-              <a:rPr lang="en-US" sz="2400" dirty="0"/>
-              <a:t>:</a:t>
-            </a:r>
-          </a:p>
-          <a:p>
-            <a:pPr marL="971550" lvl="1" indent="-514350">
-              <a:buFont typeface="+mj-lt"/>
-              <a:buAutoNum type="romanUcPeriod"/>
+              <a:rPr lang="en-US" dirty="0"/>
+              <a:t>Tools</a:t>
+            </a:r>
+          </a:p>
+          <a:p>
+            <a:pPr lvl="1">
+              <a:buFont typeface="Courier New" panose="02070309020205020404" pitchFamily="49" charset="0"/>
+              <a:buChar char="o"/>
             </a:pPr>
             <a:r>
-              <a:rPr lang="en-US" sz="2000" dirty="0"/>
-              <a:t>“The Strange World of Quantum Mechanics” by Daniel F. </a:t>
-            </a:r>
-            <a:r>
-              <a:rPr lang="en-US" sz="2000" dirty="0" err="1"/>
-              <a:t>Styer</a:t>
-            </a:r>
-            <a:endParaRPr lang="en-US" sz="2000" dirty="0"/>
-          </a:p>
-          <a:p>
-            <a:pPr marL="971550" lvl="1" indent="-514350">
-              <a:buFont typeface="+mj-lt"/>
-              <a:buAutoNum type="romanUcPeriod"/>
+              <a:rPr lang="en-US" dirty="0" err="1"/>
+              <a:t>Qiskit</a:t>
+            </a:r>
+            <a:r>
+              <a:rPr lang="en-US" dirty="0"/>
+              <a:t> website for use of the </a:t>
+            </a:r>
+            <a:r>
+              <a:rPr lang="en-US" dirty="0" err="1"/>
+              <a:t>qiskit</a:t>
+            </a:r>
+            <a:r>
+              <a:rPr lang="en-US" dirty="0"/>
+              <a:t> library</a:t>
+            </a:r>
+          </a:p>
+          <a:p>
+            <a:pPr lvl="1">
+              <a:buFont typeface="Courier New" panose="02070309020205020404" pitchFamily="49" charset="0"/>
+              <a:buChar char="o"/>
             </a:pPr>
             <a:r>
-              <a:rPr lang="en-US" sz="2000" dirty="0"/>
-              <a:t>“An Introduction to Quantum Computing” by Phillip Kaye, Raymond Laflamme and Michele </a:t>
-            </a:r>
-            <a:r>
-              <a:rPr lang="en-US" sz="2000" dirty="0" err="1"/>
-              <a:t>Mosca</a:t>
-            </a:r>
-            <a:endParaRPr lang="en-US" sz="2000" dirty="0"/>
+              <a:rPr lang="en-US" dirty="0"/>
+              <a:t>IBM website for creating quantum circuits and simulating them on real quantum computers</a:t>
+            </a:r>
+          </a:p>
+          <a:p>
+            <a:r>
+              <a:rPr lang="en-US" dirty="0"/>
+              <a:t>Assignments</a:t>
+            </a:r>
+          </a:p>
+          <a:p>
+            <a:pPr lvl="1">
+              <a:buFont typeface="Courier New" panose="02070309020205020404" pitchFamily="49" charset="0"/>
+              <a:buChar char="o"/>
+            </a:pPr>
+            <a:r>
+              <a:rPr lang="en-US" dirty="0"/>
+              <a:t>Some theory and some practice</a:t>
+            </a:r>
+          </a:p>
+          <a:p>
+            <a:pPr lvl="1">
+              <a:buFont typeface="Courier New" panose="02070309020205020404" pitchFamily="49" charset="0"/>
+              <a:buChar char="o"/>
+            </a:pPr>
+            <a:r>
+              <a:rPr lang="en-US" dirty="0"/>
+              <a:t>(Pending)</a:t>
+            </a:r>
           </a:p>
         </p:txBody>
       </p:sp>
     </p:spTree>
     <p:extLst>
       <p:ext uri="{BB962C8B-B14F-4D97-AF65-F5344CB8AC3E}">
-        <p14:creationId xmlns:p14="http://schemas.microsoft.com/office/powerpoint/2010/main" val="823450303"/>
+        <p14:creationId xmlns:p14="http://schemas.microsoft.com/office/powerpoint/2010/main" val="3573531070"/>
       </p:ext>
     </p:extLst>
   </p:cSld>

</xml_diff>